<commit_message>
changes 7 april 22
</commit_message>
<xml_diff>
--- a/OMM-Task1.pptx
+++ b/OMM-Task1.pptx
@@ -5,14 +5,12 @@
     <p:sldMasterId id="2147483648" r:id="rId1"/>
   </p:sldMasterIdLst>
   <p:notesMasterIdLst>
-    <p:notesMasterId r:id="rId7"/>
+    <p:notesMasterId r:id="rId5"/>
   </p:notesMasterIdLst>
   <p:sldIdLst>
     <p:sldId id="256" r:id="rId2"/>
     <p:sldId id="260" r:id="rId3"/>
-    <p:sldId id="257" r:id="rId4"/>
-    <p:sldId id="259" r:id="rId5"/>
-    <p:sldId id="258" r:id="rId6"/>
+    <p:sldId id="261" r:id="rId4"/>
   </p:sldIdLst>
   <p:sldSz cx="9144000" cy="6858000" type="screen4x3"/>
   <p:notesSz cx="6858000" cy="9144000"/>
@@ -196,7 +194,7 @@
           <a:p>
             <a:fld id="{8ED20E8B-5375-4866-9280-845CC2BA6C2A}" type="datetimeFigureOut">
               <a:rPr lang="fr-FR" smtClean="0"/>
-              <a:t>21/01/2022</a:t>
+              <a:t>28/01/2022</a:t>
             </a:fld>
             <a:endParaRPr lang="fr-FR"/>
           </a:p>
@@ -510,7 +508,7 @@
           <a:p>
             <a:r>
               <a:rPr lang="en-US" dirty="0" smtClean="0"/>
-              <a:t>The monkey has to learn to press the screen during a 2-s window after a random coo begins to play</a:t>
+              <a:t>The monkey has to learn to press the screen during a 3-s window after a random coo begins to play</a:t>
             </a:r>
           </a:p>
           <a:p>
@@ -520,22 +518,18 @@
             </a:r>
             <a:r>
               <a:rPr lang="en-US" baseline="0" dirty="0" smtClean="0"/>
-              <a:t> before coo </a:t>
-            </a:r>
-            <a:r>
-              <a:rPr lang="en-US" baseline="0" smtClean="0"/>
-              <a:t>onset – unlike Task1_1)</a:t>
+              <a:t> before coo onset – unlike Task1_1)</a:t>
             </a:r>
             <a:endParaRPr lang="en-US" dirty="0" smtClean="0"/>
           </a:p>
           <a:p>
             <a:r>
               <a:rPr lang="en-US" dirty="0" smtClean="0"/>
-              <a:t>The coo is played right</a:t>
+              <a:t>The coo is played </a:t>
             </a:r>
             <a:r>
               <a:rPr lang="en-US" baseline="0" dirty="0" smtClean="0"/>
-              <a:t> after the button display (with the uncompressible delay caused by the server-client dialogue)  and there is a large 2000ms response window after stimulus onset</a:t>
+              <a:t>after the button display (with several 100ms delay caused by the server-client dialogue)  and there is a large 3000ms response window after stimulus onset</a:t>
             </a:r>
           </a:p>
         </p:txBody>
@@ -622,21 +616,13 @@
           <a:p>
             <a:r>
               <a:rPr lang="en-US" dirty="0" smtClean="0"/>
-              <a:t>Now the monkey learns </a:t>
+              <a:t>Now the monkey learns :</a:t>
             </a:r>
+          </a:p>
+          <a:p>
             <a:r>
               <a:rPr lang="en-US" dirty="0" smtClean="0"/>
-              <a:t>:</a:t>
-            </a:r>
-          </a:p>
-          <a:p>
-            <a:r>
-              <a:rPr lang="en-US" dirty="0" smtClean="0"/>
-              <a:t>- to </a:t>
-            </a:r>
-            <a:r>
-              <a:rPr lang="en-US" dirty="0" smtClean="0"/>
-              <a:t>dissociate the response</a:t>
+              <a:t>- to dissociate the response</a:t>
             </a:r>
             <a:r>
               <a:rPr lang="en-US" baseline="0" dirty="0" smtClean="0"/>
@@ -646,11 +632,7 @@
           <a:p>
             <a:r>
               <a:rPr lang="en-US" baseline="0" dirty="0" smtClean="0"/>
-              <a:t>- and </a:t>
-            </a:r>
-            <a:r>
-              <a:rPr lang="en-US" baseline="0" dirty="0" smtClean="0"/>
-              <a:t>to respond fast, during the vocalization: response window progressively shortened to 500ms (coo duration)</a:t>
+              <a:t>- and to respond fast, during the vocalization: response window progressively shortened to 500ms (coo duration)</a:t>
             </a:r>
           </a:p>
           <a:p>
@@ -676,6 +658,179 @@
             <a:fld id="{15D2D560-4C87-49C4-A793-549D588D90F4}" type="slidenum">
               <a:rPr lang="fr-FR" smtClean="0"/>
               <a:t>2</a:t>
+            </a:fld>
+            <a:endParaRPr lang="fr-FR"/>
+          </a:p>
+        </p:txBody>
+      </p:sp>
+    </p:spTree>
+    <p:extLst>
+      <p:ext uri="{BB962C8B-B14F-4D97-AF65-F5344CB8AC3E}">
+        <p14:creationId xmlns:p14="http://schemas.microsoft.com/office/powerpoint/2010/main" val="3998205015"/>
+      </p:ext>
+    </p:extLst>
+  </p:cSld>
+  <p:clrMapOvr>
+    <a:masterClrMapping/>
+  </p:clrMapOvr>
+</p:notes>
+</file>
+
+<file path=ppt/notesSlides/notesSlide3.xml><?xml version="1.0" encoding="utf-8"?>
+<p:notes xmlns:a="http://schemas.openxmlformats.org/drawingml/2006/main" xmlns:r="http://schemas.openxmlformats.org/officeDocument/2006/relationships" xmlns:p="http://schemas.openxmlformats.org/presentationml/2006/main">
+  <p:cSld>
+    <p:spTree>
+      <p:nvGrpSpPr>
+        <p:cNvPr id="1" name=""/>
+        <p:cNvGrpSpPr/>
+        <p:nvPr/>
+      </p:nvGrpSpPr>
+      <p:grpSpPr>
+        <a:xfrm>
+          <a:off x="0" y="0"/>
+          <a:ext cx="0" cy="0"/>
+          <a:chOff x="0" y="0"/>
+          <a:chExt cx="0" cy="0"/>
+        </a:xfrm>
+      </p:grpSpPr>
+      <p:sp>
+        <p:nvSpPr>
+          <p:cNvPr id="2" name="Slide Image Placeholder 1"/>
+          <p:cNvSpPr>
+            <a:spLocks noGrp="1" noRot="1" noChangeAspect="1"/>
+          </p:cNvSpPr>
+          <p:nvPr>
+            <p:ph type="sldImg"/>
+          </p:nvPr>
+        </p:nvSpPr>
+        <p:spPr/>
+      </p:sp>
+      <p:sp>
+        <p:nvSpPr>
+          <p:cNvPr id="3" name="Notes Placeholder 2"/>
+          <p:cNvSpPr>
+            <a:spLocks noGrp="1"/>
+          </p:cNvSpPr>
+          <p:nvPr>
+            <p:ph type="body" idx="1"/>
+          </p:nvPr>
+        </p:nvSpPr>
+        <p:spPr/>
+        <p:txBody>
+          <a:bodyPr/>
+          <a:lstStyle/>
+          <a:p>
+            <a:pPr marL="0" marR="0" indent="0" algn="l" defTabSz="914400" rtl="0" eaLnBrk="1" fontAlgn="auto" latinLnBrk="0" hangingPunct="1">
+              <a:lnSpc>
+                <a:spcPct val="100000"/>
+              </a:lnSpc>
+              <a:spcBef>
+                <a:spcPts val="0"/>
+              </a:spcBef>
+              <a:spcAft>
+                <a:spcPts val="0"/>
+              </a:spcAft>
+              <a:buClrTx/>
+              <a:buSzTx/>
+              <a:buFontTx/>
+              <a:buNone/>
+              <a:tabLst/>
+              <a:defRPr/>
+            </a:pPr>
+            <a:r>
+              <a:rPr lang="en-US" baseline="0" dirty="0" smtClean="0"/>
+              <a:t>Now a different coo is introduced before the target coo, repeated 1-7 times in steps of increasing numbers,.</a:t>
+            </a:r>
+          </a:p>
+          <a:p>
+            <a:pPr marL="0" marR="0" indent="0" algn="l" defTabSz="914400" rtl="0" eaLnBrk="1" fontAlgn="auto" latinLnBrk="0" hangingPunct="1">
+              <a:lnSpc>
+                <a:spcPct val="100000"/>
+              </a:lnSpc>
+              <a:spcBef>
+                <a:spcPts val="0"/>
+              </a:spcBef>
+              <a:spcAft>
+                <a:spcPts val="0"/>
+              </a:spcAft>
+              <a:buClrTx/>
+              <a:buSzTx/>
+              <a:buFontTx/>
+              <a:buNone/>
+              <a:tabLst/>
+              <a:defRPr/>
+            </a:pPr>
+            <a:r>
+              <a:rPr lang="en-US" baseline="0" dirty="0" smtClean="0"/>
+              <a:t>The monkey must learn to respond to the last – different – coo</a:t>
+            </a:r>
+          </a:p>
+          <a:p>
+            <a:pPr marL="0" marR="0" indent="0" algn="l" defTabSz="914400" rtl="0" eaLnBrk="1" fontAlgn="auto" latinLnBrk="0" hangingPunct="1">
+              <a:lnSpc>
+                <a:spcPct val="100000"/>
+              </a:lnSpc>
+              <a:spcBef>
+                <a:spcPts val="0"/>
+              </a:spcBef>
+              <a:spcAft>
+                <a:spcPts val="0"/>
+              </a:spcAft>
+              <a:buClrTx/>
+              <a:buSzTx/>
+              <a:buFontTx/>
+              <a:buNone/>
+              <a:tabLst/>
+              <a:defRPr/>
+            </a:pPr>
+            <a:r>
+              <a:rPr lang="en-US" baseline="0" dirty="0" smtClean="0"/>
+              <a:t>Levels 1-6: progressively increase numbers of repetitions of coo1 from a single one to up to 6 before target coo</a:t>
+            </a:r>
+          </a:p>
+          <a:p>
+            <a:pPr marL="0" marR="0" indent="0" algn="l" defTabSz="914400" rtl="0" eaLnBrk="1" fontAlgn="auto" latinLnBrk="0" hangingPunct="1">
+              <a:lnSpc>
+                <a:spcPct val="100000"/>
+              </a:lnSpc>
+              <a:spcBef>
+                <a:spcPts val="0"/>
+              </a:spcBef>
+              <a:spcAft>
+                <a:spcPts val="0"/>
+              </a:spcAft>
+              <a:buClrTx/>
+              <a:buSzTx/>
+              <a:buFontTx/>
+              <a:buNone/>
+              <a:tabLst/>
+              <a:defRPr/>
+            </a:pPr>
+            <a:endParaRPr lang="en-US" baseline="0" dirty="0" smtClean="0"/>
+          </a:p>
+          <a:p>
+            <a:endParaRPr lang="en-US" baseline="0" dirty="0" smtClean="0"/>
+          </a:p>
+        </p:txBody>
+      </p:sp>
+      <p:sp>
+        <p:nvSpPr>
+          <p:cNvPr id="4" name="Slide Number Placeholder 3"/>
+          <p:cNvSpPr>
+            <a:spLocks noGrp="1"/>
+          </p:cNvSpPr>
+          <p:nvPr>
+            <p:ph type="sldNum" sz="quarter" idx="10"/>
+          </p:nvPr>
+        </p:nvSpPr>
+        <p:spPr/>
+        <p:txBody>
+          <a:bodyPr/>
+          <a:lstStyle/>
+          <a:p>
+            <a:fld id="{15D2D560-4C87-49C4-A793-549D588D90F4}" type="slidenum">
+              <a:rPr lang="fr-FR" smtClean="0"/>
+              <a:t>3</a:t>
             </a:fld>
             <a:endParaRPr lang="fr-FR"/>
           </a:p>
@@ -875,7 +1030,7 @@
           <a:p>
             <a:fld id="{3CACE2DD-BF9E-4CF2-99F8-8C1D2D4F84CA}" type="datetimeFigureOut">
               <a:rPr lang="fr-FR" smtClean="0"/>
-              <a:t>21/01/2022</a:t>
+              <a:t>28/01/2022</a:t>
             </a:fld>
             <a:endParaRPr lang="fr-FR"/>
           </a:p>
@@ -1045,7 +1200,7 @@
           <a:p>
             <a:fld id="{3CACE2DD-BF9E-4CF2-99F8-8C1D2D4F84CA}" type="datetimeFigureOut">
               <a:rPr lang="fr-FR" smtClean="0"/>
-              <a:t>21/01/2022</a:t>
+              <a:t>28/01/2022</a:t>
             </a:fld>
             <a:endParaRPr lang="fr-FR"/>
           </a:p>
@@ -1225,7 +1380,7 @@
           <a:p>
             <a:fld id="{3CACE2DD-BF9E-4CF2-99F8-8C1D2D4F84CA}" type="datetimeFigureOut">
               <a:rPr lang="fr-FR" smtClean="0"/>
-              <a:t>21/01/2022</a:t>
+              <a:t>28/01/2022</a:t>
             </a:fld>
             <a:endParaRPr lang="fr-FR"/>
           </a:p>
@@ -1395,7 +1550,7 @@
           <a:p>
             <a:fld id="{3CACE2DD-BF9E-4CF2-99F8-8C1D2D4F84CA}" type="datetimeFigureOut">
               <a:rPr lang="fr-FR" smtClean="0"/>
-              <a:t>21/01/2022</a:t>
+              <a:t>28/01/2022</a:t>
             </a:fld>
             <a:endParaRPr lang="fr-FR"/>
           </a:p>
@@ -1641,7 +1796,7 @@
           <a:p>
             <a:fld id="{3CACE2DD-BF9E-4CF2-99F8-8C1D2D4F84CA}" type="datetimeFigureOut">
               <a:rPr lang="fr-FR" smtClean="0"/>
-              <a:t>21/01/2022</a:t>
+              <a:t>28/01/2022</a:t>
             </a:fld>
             <a:endParaRPr lang="fr-FR"/>
           </a:p>
@@ -1929,7 +2084,7 @@
           <a:p>
             <a:fld id="{3CACE2DD-BF9E-4CF2-99F8-8C1D2D4F84CA}" type="datetimeFigureOut">
               <a:rPr lang="fr-FR" smtClean="0"/>
-              <a:t>21/01/2022</a:t>
+              <a:t>28/01/2022</a:t>
             </a:fld>
             <a:endParaRPr lang="fr-FR"/>
           </a:p>
@@ -2351,7 +2506,7 @@
           <a:p>
             <a:fld id="{3CACE2DD-BF9E-4CF2-99F8-8C1D2D4F84CA}" type="datetimeFigureOut">
               <a:rPr lang="fr-FR" smtClean="0"/>
-              <a:t>21/01/2022</a:t>
+              <a:t>28/01/2022</a:t>
             </a:fld>
             <a:endParaRPr lang="fr-FR"/>
           </a:p>
@@ -2469,7 +2624,7 @@
           <a:p>
             <a:fld id="{3CACE2DD-BF9E-4CF2-99F8-8C1D2D4F84CA}" type="datetimeFigureOut">
               <a:rPr lang="fr-FR" smtClean="0"/>
-              <a:t>21/01/2022</a:t>
+              <a:t>28/01/2022</a:t>
             </a:fld>
             <a:endParaRPr lang="fr-FR"/>
           </a:p>
@@ -2564,7 +2719,7 @@
           <a:p>
             <a:fld id="{3CACE2DD-BF9E-4CF2-99F8-8C1D2D4F84CA}" type="datetimeFigureOut">
               <a:rPr lang="fr-FR" smtClean="0"/>
-              <a:t>21/01/2022</a:t>
+              <a:t>28/01/2022</a:t>
             </a:fld>
             <a:endParaRPr lang="fr-FR"/>
           </a:p>
@@ -2841,7 +2996,7 @@
           <a:p>
             <a:fld id="{3CACE2DD-BF9E-4CF2-99F8-8C1D2D4F84CA}" type="datetimeFigureOut">
               <a:rPr lang="fr-FR" smtClean="0"/>
-              <a:t>21/01/2022</a:t>
+              <a:t>28/01/2022</a:t>
             </a:fld>
             <a:endParaRPr lang="fr-FR"/>
           </a:p>
@@ -3094,7 +3249,7 @@
           <a:p>
             <a:fld id="{3CACE2DD-BF9E-4CF2-99F8-8C1D2D4F84CA}" type="datetimeFigureOut">
               <a:rPr lang="fr-FR" smtClean="0"/>
-              <a:t>21/01/2022</a:t>
+              <a:t>28/01/2022</a:t>
             </a:fld>
             <a:endParaRPr lang="fr-FR"/>
           </a:p>
@@ -3307,7 +3462,7 @@
           <a:p>
             <a:fld id="{3CACE2DD-BF9E-4CF2-99F8-8C1D2D4F84CA}" type="datetimeFigureOut">
               <a:rPr lang="fr-FR" smtClean="0"/>
-              <a:t>21/01/2022</a:t>
+              <a:t>28/01/2022</a:t>
             </a:fld>
             <a:endParaRPr lang="fr-FR"/>
           </a:p>
@@ -3969,8 +4124,12 @@
             <a:p>
               <a:pPr algn="ctr"/>
               <a:r>
+                <a:rPr lang="en-US" sz="1400" dirty="0"/>
+                <a:t>3</a:t>
+              </a:r>
+              <a:r>
                 <a:rPr lang="en-US" sz="1400" dirty="0" smtClean="0"/>
-                <a:t>2000ms</a:t>
+                <a:t>000ms</a:t>
               </a:r>
             </a:p>
           </p:txBody>
@@ -4092,9 +4251,7 @@
                 <a:avLst/>
               </a:prstGeom>
               <a:solidFill>
-                <a:schemeClr val="bg1">
-                  <a:lumMod val="75000"/>
-                </a:schemeClr>
+                <a:srgbClr val="00B050"/>
               </a:solidFill>
               <a:ln>
                 <a:solidFill>
@@ -4123,7 +4280,11 @@
               <a:lstStyle/>
               <a:p>
                 <a:pPr algn="ctr"/>
-                <a:endParaRPr lang="fr-FR"/>
+                <a:endParaRPr lang="fr-FR">
+                  <a:solidFill>
+                    <a:srgbClr val="00B050"/>
+                  </a:solidFill>
+                </a:endParaRPr>
               </a:p>
             </p:txBody>
           </p:sp>
@@ -4136,7 +4297,7 @@
             <p:spPr>
               <a:xfrm>
                 <a:off x="6962036" y="649934"/>
-                <a:ext cx="1247329" cy="523220"/>
+                <a:ext cx="1247329" cy="738664"/>
               </a:xfrm>
               <a:prstGeom prst="rect">
                 <a:avLst/>
@@ -4159,8 +4320,24 @@
                 <a:pPr algn="ctr"/>
                 <a:r>
                   <a:rPr lang="en-US" sz="1400" dirty="0" smtClean="0"/>
-                  <a:t>Aborted trial</a:t>
+                  <a:t>Aborted </a:t>
                 </a:r>
+                <a:r>
+                  <a:rPr lang="en-US" sz="1400" dirty="0" smtClean="0"/>
+                  <a:t>trial</a:t>
+                </a:r>
+              </a:p>
+              <a:p>
+                <a:pPr algn="ctr"/>
+                <a:r>
+                  <a:rPr lang="en-US" sz="1400" dirty="0"/>
+                  <a:t>2-s </a:t>
+                </a:r>
+                <a:r>
+                  <a:rPr lang="en-US" sz="1400" dirty="0" smtClean="0"/>
+                  <a:t>timeout</a:t>
+                </a:r>
+                <a:endParaRPr lang="en-US" sz="1400" dirty="0"/>
               </a:p>
             </p:txBody>
           </p:sp>
@@ -4508,8 +4685,12 @@
               <a:p>
                 <a:pPr algn="ctr"/>
                 <a:r>
+                  <a:rPr lang="en-US" sz="1400" dirty="0"/>
+                  <a:t>2</a:t>
+                </a:r>
+                <a:r>
                   <a:rPr lang="en-US" sz="1400" dirty="0" smtClean="0"/>
-                  <a:t>1-s black screen</a:t>
+                  <a:t>-s black screen</a:t>
                 </a:r>
               </a:p>
             </p:txBody>
@@ -4797,166 +4978,6 @@
             </p:style>
           </p:cxnSp>
         </p:grpSp>
-      </p:grpSp>
-      <p:grpSp>
-        <p:nvGrpSpPr>
-          <p:cNvPr id="42" name="Group 41"/>
-          <p:cNvGrpSpPr/>
-          <p:nvPr/>
-        </p:nvGrpSpPr>
-        <p:grpSpPr>
-          <a:xfrm>
-            <a:off x="6393117" y="685800"/>
-            <a:ext cx="1151126" cy="4724400"/>
-            <a:chOff x="3017178" y="711745"/>
-            <a:chExt cx="1151126" cy="4724400"/>
-          </a:xfrm>
-        </p:grpSpPr>
-        <p:grpSp>
-          <p:nvGrpSpPr>
-            <p:cNvPr id="43" name="Group 42"/>
-            <p:cNvGrpSpPr/>
-            <p:nvPr/>
-          </p:nvGrpSpPr>
-          <p:grpSpPr>
-            <a:xfrm>
-              <a:off x="3021446" y="711745"/>
-              <a:ext cx="1146858" cy="1600200"/>
-              <a:chOff x="3021446" y="748477"/>
-              <a:chExt cx="1146858" cy="1600200"/>
-            </a:xfrm>
-          </p:grpSpPr>
-          <p:sp>
-            <p:nvSpPr>
-              <p:cNvPr id="45" name="Rectangle 44"/>
-              <p:cNvSpPr/>
-              <p:nvPr/>
-            </p:nvSpPr>
-            <p:spPr>
-              <a:xfrm>
-                <a:off x="3025304" y="1549946"/>
-                <a:ext cx="1143000" cy="798731"/>
-              </a:xfrm>
-              <a:prstGeom prst="rect">
-                <a:avLst/>
-              </a:prstGeom>
-              <a:solidFill>
-                <a:srgbClr val="00B050"/>
-              </a:solidFill>
-              <a:ln>
-                <a:solidFill>
-                  <a:schemeClr val="tx1"/>
-                </a:solidFill>
-              </a:ln>
-            </p:spPr>
-            <p:style>
-              <a:lnRef idx="2">
-                <a:schemeClr val="accent1">
-                  <a:shade val="50000"/>
-                </a:schemeClr>
-              </a:lnRef>
-              <a:fillRef idx="1">
-                <a:schemeClr val="accent1"/>
-              </a:fillRef>
-              <a:effectRef idx="0">
-                <a:schemeClr val="accent1"/>
-              </a:effectRef>
-              <a:fontRef idx="minor">
-                <a:schemeClr val="lt1"/>
-              </a:fontRef>
-            </p:style>
-            <p:txBody>
-              <a:bodyPr rtlCol="0" anchor="ctr"/>
-              <a:lstStyle/>
-              <a:p>
-                <a:pPr algn="ctr"/>
-                <a:endParaRPr lang="fr-FR"/>
-              </a:p>
-            </p:txBody>
-          </p:sp>
-          <p:sp>
-            <p:nvSpPr>
-              <p:cNvPr id="58" name="TextBox 57"/>
-              <p:cNvSpPr txBox="1"/>
-              <p:nvPr/>
-            </p:nvSpPr>
-            <p:spPr>
-              <a:xfrm>
-                <a:off x="3021446" y="748477"/>
-                <a:ext cx="1142236" cy="738664"/>
-              </a:xfrm>
-              <a:prstGeom prst="rect">
-                <a:avLst/>
-              </a:prstGeom>
-              <a:noFill/>
-            </p:spPr>
-            <p:txBody>
-              <a:bodyPr wrap="none" rtlCol="0">
-                <a:spAutoFit/>
-              </a:bodyPr>
-              <a:lstStyle/>
-              <a:p>
-                <a:pPr algn="ctr"/>
-                <a:r>
-                  <a:rPr lang="en-US" sz="1400" b="1" dirty="0" smtClean="0"/>
-                  <a:t>RESPONSE </a:t>
-                </a:r>
-              </a:p>
-              <a:p>
-                <a:pPr algn="ctr"/>
-                <a:r>
-                  <a:rPr lang="en-US" sz="1400" b="1" dirty="0" smtClean="0"/>
-                  <a:t>OFF BUTTON</a:t>
-                </a:r>
-              </a:p>
-              <a:p>
-                <a:pPr algn="ctr"/>
-                <a:r>
-                  <a:rPr lang="en-US" sz="1400" dirty="0" smtClean="0"/>
-                  <a:t>2-s timeout</a:t>
-                </a:r>
-              </a:p>
-            </p:txBody>
-          </p:sp>
-        </p:grpSp>
-        <p:cxnSp>
-          <p:nvCxnSpPr>
-            <p:cNvPr id="44" name="Straight Connector 43"/>
-            <p:cNvCxnSpPr/>
-            <p:nvPr/>
-          </p:nvCxnSpPr>
-          <p:spPr>
-            <a:xfrm>
-              <a:off x="3017178" y="2133600"/>
-              <a:ext cx="0" cy="3302545"/>
-            </a:xfrm>
-            <a:prstGeom prst="line">
-              <a:avLst/>
-            </a:prstGeom>
-            <a:ln>
-              <a:solidFill>
-                <a:schemeClr val="bg1">
-                  <a:lumMod val="75000"/>
-                </a:schemeClr>
-              </a:solidFill>
-              <a:prstDash val="sysDash"/>
-            </a:ln>
-          </p:spPr>
-          <p:style>
-            <a:lnRef idx="1">
-              <a:schemeClr val="accent1"/>
-            </a:lnRef>
-            <a:fillRef idx="0">
-              <a:schemeClr val="accent1"/>
-            </a:fillRef>
-            <a:effectRef idx="0">
-              <a:schemeClr val="accent1"/>
-            </a:effectRef>
-            <a:fontRef idx="minor">
-              <a:schemeClr val="tx1"/>
-            </a:fontRef>
-          </p:style>
-        </p:cxnSp>
       </p:grpSp>
     </p:spTree>
     <p:extLst>
@@ -5267,7 +5288,7 @@
                                           </p:stCondLst>
                                         </p:cTn>
                                         <p:tgtEl>
-                                          <p:spTgt spid="42"/>
+                                          <p:spTgt spid="9"/>
                                         </p:tgtEl>
                                         <p:attrNameLst>
                                           <p:attrName>style.visibility</p:attrName>
@@ -5280,59 +5301,6 @@
                                     <p:animEffect transition="in" filter="randombar(horizontal)">
                                       <p:cBhvr>
                                         <p:cTn id="32" dur="500"/>
-                                        <p:tgtEl>
-                                          <p:spTgt spid="42"/>
-                                        </p:tgtEl>
-                                      </p:cBhvr>
-                                    </p:animEffect>
-                                  </p:childTnLst>
-                                </p:cTn>
-                              </p:par>
-                            </p:childTnLst>
-                          </p:cTn>
-                        </p:par>
-                      </p:childTnLst>
-                    </p:cTn>
-                  </p:par>
-                  <p:par>
-                    <p:cTn id="33" fill="hold">
-                      <p:stCondLst>
-                        <p:cond delay="indefinite"/>
-                      </p:stCondLst>
-                      <p:childTnLst>
-                        <p:par>
-                          <p:cTn id="34" fill="hold">
-                            <p:stCondLst>
-                              <p:cond delay="0"/>
-                            </p:stCondLst>
-                            <p:childTnLst>
-                              <p:par>
-                                <p:cTn id="35" presetID="14" presetClass="entr" presetSubtype="10" fill="hold" nodeType="clickEffect">
-                                  <p:stCondLst>
-                                    <p:cond delay="0"/>
-                                  </p:stCondLst>
-                                  <p:childTnLst>
-                                    <p:set>
-                                      <p:cBhvr>
-                                        <p:cTn id="36" dur="1" fill="hold">
-                                          <p:stCondLst>
-                                            <p:cond delay="0"/>
-                                          </p:stCondLst>
-                                        </p:cTn>
-                                        <p:tgtEl>
-                                          <p:spTgt spid="9"/>
-                                        </p:tgtEl>
-                                        <p:attrNameLst>
-                                          <p:attrName>style.visibility</p:attrName>
-                                        </p:attrNameLst>
-                                      </p:cBhvr>
-                                      <p:to>
-                                        <p:strVal val="visible"/>
-                                      </p:to>
-                                    </p:set>
-                                    <p:animEffect transition="in" filter="randombar(horizontal)">
-                                      <p:cBhvr>
-                                        <p:cTn id="37" dur="500"/>
                                         <p:tgtEl>
                                           <p:spTgt spid="9"/>
                                         </p:tgtEl>
@@ -5365,11 +5333,11 @@
               </p:nextCondLst>
             </p:seq>
             <p:par>
-              <p:cTn id="38"/>
+              <p:cTn id="33"/>
             </p:par>
             <p:audio>
               <p:cMediaNode vol="80000" mute="1">
-                <p:cTn id="39" fill="hold" display="0">
+                <p:cTn id="34" fill="hold" display="0">
                   <p:stCondLst>
                     <p:cond delay="indefinite"/>
                   </p:stCondLst>
@@ -5470,7 +5438,7 @@
         <p:spPr>
           <a:xfrm>
             <a:off x="3911085" y="0"/>
-            <a:ext cx="1346715" cy="461665"/>
+            <a:ext cx="2254015" cy="461665"/>
           </a:xfrm>
           <a:prstGeom prst="rect">
             <a:avLst/>
@@ -5485,7 +5453,7 @@
           <a:p>
             <a:r>
               <a:rPr lang="en-US" sz="2400" b="1" dirty="0" smtClean="0"/>
-              <a:t>TASK 1_1</a:t>
+              <a:t>TASK 1 - Phase 1</a:t>
             </a:r>
             <a:endParaRPr lang="fr-FR" sz="2400" b="1" dirty="0"/>
           </a:p>
@@ -5706,7 +5674,7 @@
               <a:pPr algn="ctr"/>
               <a:r>
                 <a:rPr lang="en-US" sz="1400" dirty="0" smtClean="0"/>
-                <a:t>2000-500ms</a:t>
+                <a:t>2500-500ms</a:t>
               </a:r>
             </a:p>
             <a:p>
@@ -5835,9 +5803,7 @@
                 <a:avLst/>
               </a:prstGeom>
               <a:solidFill>
-                <a:schemeClr val="bg1">
-                  <a:lumMod val="75000"/>
-                </a:schemeClr>
+                <a:srgbClr val="00B050"/>
               </a:solidFill>
               <a:ln>
                 <a:solidFill>
@@ -6245,14 +6211,14 @@
                 <a:pPr algn="ctr"/>
                 <a:r>
                   <a:rPr lang="en-US" sz="1400" b="1" dirty="0" smtClean="0"/>
-                  <a:t>$$ </a:t>
+                  <a:t>reward </a:t>
                 </a:r>
               </a:p>
               <a:p>
                 <a:pPr algn="ctr"/>
                 <a:r>
                   <a:rPr lang="en-US" sz="1400" dirty="0" smtClean="0"/>
-                  <a:t>1-s black screen</a:t>
+                  <a:t>2-s black screen</a:t>
                 </a:r>
               </a:p>
             </p:txBody>
@@ -7155,8 +7121,8 @@
         </p:nvSpPr>
         <p:spPr>
           <a:xfrm>
-            <a:off x="304800" y="2514600"/>
-            <a:ext cx="1905000" cy="1143000"/>
+            <a:off x="250858" y="2819400"/>
+            <a:ext cx="1143000" cy="798731"/>
           </a:xfrm>
           <a:prstGeom prst="rect">
             <a:avLst/>
@@ -7199,66 +7165,14 @@
       </p:sp>
       <p:sp>
         <p:nvSpPr>
-          <p:cNvPr id="7" name="Rectangle 6">
-            <a:hlinkClick r:id="" action="ppaction://noaction">
-              <a:snd r:embed="rId2" name="Random_coo_2.5_001.wav"/>
-            </a:hlinkClick>
-          </p:cNvPr>
-          <p:cNvSpPr/>
-          <p:nvPr/>
-        </p:nvSpPr>
-        <p:spPr>
-          <a:xfrm>
-            <a:off x="2514600" y="2514600"/>
-            <a:ext cx="1905000" cy="1143000"/>
-          </a:xfrm>
-          <a:prstGeom prst="rect">
-            <a:avLst/>
-          </a:prstGeom>
-          <a:solidFill>
-            <a:schemeClr val="bg1"/>
-          </a:solidFill>
-          <a:ln>
-            <a:solidFill>
-              <a:schemeClr val="tx1"/>
-            </a:solidFill>
-          </a:ln>
-        </p:spPr>
-        <p:style>
-          <a:lnRef idx="2">
-            <a:schemeClr val="accent1">
-              <a:shade val="50000"/>
-            </a:schemeClr>
-          </a:lnRef>
-          <a:fillRef idx="1">
-            <a:schemeClr val="accent1"/>
-          </a:fillRef>
-          <a:effectRef idx="0">
-            <a:schemeClr val="accent1"/>
-          </a:effectRef>
-          <a:fontRef idx="minor">
-            <a:schemeClr val="lt1"/>
-          </a:fontRef>
-        </p:style>
-        <p:txBody>
-          <a:bodyPr rtlCol="0" anchor="ctr"/>
-          <a:lstStyle/>
-          <a:p>
-            <a:pPr algn="ctr"/>
-            <a:endParaRPr lang="fr-FR"/>
-          </a:p>
-        </p:txBody>
-      </p:sp>
-      <p:sp>
-        <p:nvSpPr>
-          <p:cNvPr id="15" name="TextBox 14"/>
+          <p:cNvPr id="25" name="TextBox 24"/>
           <p:cNvSpPr txBox="1"/>
           <p:nvPr/>
         </p:nvSpPr>
         <p:spPr>
           <a:xfrm>
-            <a:off x="5410200" y="2667000"/>
-            <a:ext cx="1143000" cy="646331"/>
+            <a:off x="3911085" y="0"/>
+            <a:ext cx="2254015" cy="461665"/>
           </a:xfrm>
           <a:prstGeom prst="rect">
             <a:avLst/>
@@ -7266,65 +7180,501 @@
           <a:noFill/>
         </p:spPr>
         <p:txBody>
-          <a:bodyPr wrap="square" rtlCol="0">
+          <a:bodyPr wrap="none" rtlCol="0">
             <a:spAutoFit/>
           </a:bodyPr>
           <a:lstStyle/>
           <a:p>
-            <a:pPr algn="ctr"/>
             <a:r>
-              <a:rPr lang="en-US" dirty="0" smtClean="0"/>
-              <a:t>touché</a:t>
+              <a:rPr lang="en-US" sz="2400" b="1" dirty="0" smtClean="0"/>
+              <a:t>TASK 1 - Phase 2</a:t>
             </a:r>
-          </a:p>
-          <a:p>
-            <a:pPr algn="ctr"/>
-            <a:r>
-              <a:rPr lang="en-US" dirty="0" smtClean="0"/>
-              <a:t>&lt;500ms ?</a:t>
-            </a:r>
-            <a:endParaRPr lang="fr-FR" dirty="0"/>
+            <a:endParaRPr lang="fr-FR" sz="2400" b="1" dirty="0"/>
           </a:p>
         </p:txBody>
       </p:sp>
+      <p:cxnSp>
+        <p:nvCxnSpPr>
+          <p:cNvPr id="28" name="Straight Arrow Connector 27"/>
+          <p:cNvCxnSpPr/>
+          <p:nvPr/>
+        </p:nvCxnSpPr>
+        <p:spPr>
+          <a:xfrm>
+            <a:off x="76200" y="5433407"/>
+            <a:ext cx="8915400" cy="0"/>
+          </a:xfrm>
+          <a:prstGeom prst="straightConnector1">
+            <a:avLst/>
+          </a:prstGeom>
+          <a:ln w="38100">
+            <a:solidFill>
+              <a:schemeClr val="tx1"/>
+            </a:solidFill>
+            <a:tailEnd type="arrow"/>
+          </a:ln>
+        </p:spPr>
+        <p:style>
+          <a:lnRef idx="1">
+            <a:schemeClr val="accent1"/>
+          </a:lnRef>
+          <a:fillRef idx="0">
+            <a:schemeClr val="accent1"/>
+          </a:fillRef>
+          <a:effectRef idx="0">
+            <a:schemeClr val="accent1"/>
+          </a:effectRef>
+          <a:fontRef idx="minor">
+            <a:schemeClr val="tx1"/>
+          </a:fontRef>
+        </p:style>
+      </p:cxnSp>
       <p:grpSp>
         <p:nvGrpSpPr>
-          <p:cNvPr id="24" name="Group 23"/>
+          <p:cNvPr id="5" name="Group 4"/>
           <p:cNvGrpSpPr/>
           <p:nvPr/>
         </p:nvGrpSpPr>
         <p:grpSpPr>
           <a:xfrm>
-            <a:off x="6477000" y="2133600"/>
-            <a:ext cx="2552700" cy="1524000"/>
-            <a:chOff x="6477000" y="2133600"/>
-            <a:chExt cx="2552700" cy="1524000"/>
+            <a:off x="1534274" y="5585807"/>
+            <a:ext cx="1285126" cy="675620"/>
+            <a:chOff x="1534274" y="5585807"/>
+            <a:chExt cx="1582328" cy="675620"/>
           </a:xfrm>
         </p:grpSpPr>
+        <p:cxnSp>
+          <p:nvCxnSpPr>
+            <p:cNvPr id="2060" name="Straight Arrow Connector 2059"/>
+            <p:cNvCxnSpPr/>
+            <p:nvPr/>
+          </p:nvCxnSpPr>
+          <p:spPr>
+            <a:xfrm>
+              <a:off x="1534274" y="5585807"/>
+              <a:ext cx="1582328" cy="0"/>
+            </a:xfrm>
+            <a:prstGeom prst="straightConnector1">
+              <a:avLst/>
+            </a:prstGeom>
+            <a:ln w="28575">
+              <a:solidFill>
+                <a:schemeClr val="tx1"/>
+              </a:solidFill>
+              <a:headEnd type="arrow"/>
+              <a:tailEnd type="arrow"/>
+            </a:ln>
+          </p:spPr>
+          <p:style>
+            <a:lnRef idx="1">
+              <a:schemeClr val="accent1"/>
+            </a:lnRef>
+            <a:fillRef idx="0">
+              <a:schemeClr val="accent1"/>
+            </a:fillRef>
+            <a:effectRef idx="0">
+              <a:schemeClr val="accent1"/>
+            </a:effectRef>
+            <a:fontRef idx="minor">
+              <a:schemeClr val="tx1"/>
+            </a:fontRef>
+          </p:style>
+        </p:cxnSp>
+        <p:sp>
+          <p:nvSpPr>
+            <p:cNvPr id="50" name="TextBox 49"/>
+            <p:cNvSpPr txBox="1"/>
+            <p:nvPr/>
+          </p:nvSpPr>
+          <p:spPr>
+            <a:xfrm>
+              <a:off x="1803634" y="5738207"/>
+              <a:ext cx="1091966" cy="523220"/>
+            </a:xfrm>
+            <a:prstGeom prst="rect">
+              <a:avLst/>
+            </a:prstGeom>
+            <a:noFill/>
+          </p:spPr>
+          <p:txBody>
+            <a:bodyPr wrap="none" rtlCol="0">
+              <a:spAutoFit/>
+            </a:bodyPr>
+            <a:lstStyle/>
+            <a:p>
+              <a:pPr algn="ctr"/>
+              <a:r>
+                <a:rPr lang="en-US" sz="1400" b="1" dirty="0" smtClean="0"/>
+                <a:t>DELAY</a:t>
+              </a:r>
+            </a:p>
+            <a:p>
+              <a:pPr algn="ctr"/>
+              <a:r>
+                <a:rPr lang="en-US" sz="1400" dirty="0" smtClean="0"/>
+                <a:t>500-1000ms</a:t>
+              </a:r>
+            </a:p>
+          </p:txBody>
+        </p:sp>
+      </p:grpSp>
+      <p:grpSp>
+        <p:nvGrpSpPr>
+          <p:cNvPr id="6" name="Group 5"/>
+          <p:cNvGrpSpPr/>
+          <p:nvPr/>
+        </p:nvGrpSpPr>
+        <p:grpSpPr>
+          <a:xfrm>
+            <a:off x="4724400" y="5257800"/>
+            <a:ext cx="1014140" cy="1219200"/>
+            <a:chOff x="4724400" y="5257800"/>
+            <a:chExt cx="1014140" cy="1219200"/>
+          </a:xfrm>
+        </p:grpSpPr>
+        <p:cxnSp>
+          <p:nvCxnSpPr>
+            <p:cNvPr id="65" name="Straight Arrow Connector 64"/>
+            <p:cNvCxnSpPr/>
+            <p:nvPr/>
+          </p:nvCxnSpPr>
+          <p:spPr>
+            <a:xfrm>
+              <a:off x="4739818" y="5581305"/>
+              <a:ext cx="998722" cy="4502"/>
+            </a:xfrm>
+            <a:prstGeom prst="straightConnector1">
+              <a:avLst/>
+            </a:prstGeom>
+            <a:ln w="28575">
+              <a:solidFill>
+                <a:schemeClr val="tx1"/>
+              </a:solidFill>
+              <a:headEnd type="arrow"/>
+              <a:tailEnd type="arrow"/>
+            </a:ln>
+          </p:spPr>
+          <p:style>
+            <a:lnRef idx="1">
+              <a:schemeClr val="accent1"/>
+            </a:lnRef>
+            <a:fillRef idx="0">
+              <a:schemeClr val="accent1"/>
+            </a:fillRef>
+            <a:effectRef idx="0">
+              <a:schemeClr val="accent1"/>
+            </a:effectRef>
+            <a:fontRef idx="minor">
+              <a:schemeClr val="tx1"/>
+            </a:fontRef>
+          </p:style>
+        </p:cxnSp>
+        <p:sp>
+          <p:nvSpPr>
+            <p:cNvPr id="67" name="TextBox 66"/>
+            <p:cNvSpPr txBox="1"/>
+            <p:nvPr/>
+          </p:nvSpPr>
+          <p:spPr>
+            <a:xfrm>
+              <a:off x="4724400" y="5738336"/>
+              <a:ext cx="1006878" cy="738664"/>
+            </a:xfrm>
+            <a:prstGeom prst="rect">
+              <a:avLst/>
+            </a:prstGeom>
+            <a:noFill/>
+          </p:spPr>
+          <p:txBody>
+            <a:bodyPr wrap="none" rtlCol="0">
+              <a:spAutoFit/>
+            </a:bodyPr>
+            <a:lstStyle/>
+            <a:p>
+              <a:pPr algn="ctr"/>
+              <a:r>
+                <a:rPr lang="en-US" sz="1400" b="1" dirty="0" smtClean="0"/>
+                <a:t>RESPONSE </a:t>
+              </a:r>
+            </a:p>
+            <a:p>
+              <a:pPr algn="ctr"/>
+              <a:r>
+                <a:rPr lang="en-US" sz="1400" b="1" dirty="0" smtClean="0"/>
+                <a:t>WINDOW</a:t>
+              </a:r>
+            </a:p>
+            <a:p>
+              <a:pPr algn="ctr"/>
+              <a:r>
+                <a:rPr lang="en-US" sz="1400" dirty="0" smtClean="0"/>
+                <a:t>500ms</a:t>
+              </a:r>
+            </a:p>
+          </p:txBody>
+        </p:sp>
+        <p:cxnSp>
+          <p:nvCxnSpPr>
+            <p:cNvPr id="77" name="Straight Connector 76"/>
+            <p:cNvCxnSpPr/>
+            <p:nvPr/>
+          </p:nvCxnSpPr>
+          <p:spPr>
+            <a:xfrm>
+              <a:off x="5710927" y="5257800"/>
+              <a:ext cx="0" cy="152400"/>
+            </a:xfrm>
+            <a:prstGeom prst="line">
+              <a:avLst/>
+            </a:prstGeom>
+            <a:ln w="38100">
+              <a:solidFill>
+                <a:schemeClr val="tx1"/>
+              </a:solidFill>
+            </a:ln>
+          </p:spPr>
+          <p:style>
+            <a:lnRef idx="1">
+              <a:schemeClr val="accent1"/>
+            </a:lnRef>
+            <a:fillRef idx="0">
+              <a:schemeClr val="accent1"/>
+            </a:fillRef>
+            <a:effectRef idx="0">
+              <a:schemeClr val="accent1"/>
+            </a:effectRef>
+            <a:fontRef idx="minor">
+              <a:schemeClr val="tx1"/>
+            </a:fontRef>
+          </p:style>
+        </p:cxnSp>
+      </p:grpSp>
+      <p:grpSp>
+        <p:nvGrpSpPr>
+          <p:cNvPr id="11" name="Group 10"/>
+          <p:cNvGrpSpPr/>
+          <p:nvPr/>
+        </p:nvGrpSpPr>
+        <p:grpSpPr>
+          <a:xfrm>
+            <a:off x="5704367" y="950266"/>
+            <a:ext cx="1256039" cy="4493501"/>
+            <a:chOff x="5715000" y="950266"/>
+            <a:chExt cx="1256039" cy="4493501"/>
+          </a:xfrm>
+        </p:grpSpPr>
+        <p:cxnSp>
+          <p:nvCxnSpPr>
+            <p:cNvPr id="84" name="Straight Connector 83"/>
+            <p:cNvCxnSpPr/>
+            <p:nvPr/>
+          </p:nvCxnSpPr>
+          <p:spPr>
+            <a:xfrm>
+              <a:off x="5715000" y="2259449"/>
+              <a:ext cx="0" cy="3184318"/>
+            </a:xfrm>
+            <a:prstGeom prst="line">
+              <a:avLst/>
+            </a:prstGeom>
+            <a:ln>
+              <a:solidFill>
+                <a:schemeClr val="bg1">
+                  <a:lumMod val="75000"/>
+                </a:schemeClr>
+              </a:solidFill>
+              <a:prstDash val="sysDash"/>
+            </a:ln>
+          </p:spPr>
+          <p:style>
+            <a:lnRef idx="1">
+              <a:schemeClr val="accent1"/>
+            </a:lnRef>
+            <a:fillRef idx="0">
+              <a:schemeClr val="accent1"/>
+            </a:fillRef>
+            <a:effectRef idx="0">
+              <a:schemeClr val="accent1"/>
+            </a:effectRef>
+            <a:fontRef idx="minor">
+              <a:schemeClr val="tx1"/>
+            </a:fontRef>
+          </p:style>
+        </p:cxnSp>
         <p:grpSp>
           <p:nvGrpSpPr>
-            <p:cNvPr id="14" name="Group 13"/>
+            <p:cNvPr id="49" name="Group 48"/>
             <p:cNvGrpSpPr/>
             <p:nvPr/>
           </p:nvGrpSpPr>
           <p:grpSpPr>
             <a:xfrm>
-              <a:off x="7124700" y="2133600"/>
-              <a:ext cx="1905000" cy="1524000"/>
-              <a:chOff x="7010400" y="1066800"/>
-              <a:chExt cx="1905000" cy="1524000"/>
+              <a:off x="5723710" y="950266"/>
+              <a:ext cx="1247329" cy="1332131"/>
+              <a:chOff x="6962036" y="914400"/>
+              <a:chExt cx="1247329" cy="1332131"/>
             </a:xfrm>
           </p:grpSpPr>
           <p:sp>
             <p:nvSpPr>
-              <p:cNvPr id="12" name="Rectangle 11"/>
+              <p:cNvPr id="83" name="Rectangle 82"/>
               <p:cNvSpPr/>
               <p:nvPr/>
             </p:nvSpPr>
             <p:spPr>
               <a:xfrm>
-                <a:off x="7010400" y="1447800"/>
-                <a:ext cx="1905000" cy="1143000"/>
+                <a:off x="6964166" y="1447800"/>
+                <a:ext cx="1143000" cy="798731"/>
+              </a:xfrm>
+              <a:prstGeom prst="rect">
+                <a:avLst/>
+              </a:prstGeom>
+              <a:solidFill>
+                <a:srgbClr val="00B050"/>
+              </a:solidFill>
+              <a:ln>
+                <a:solidFill>
+                  <a:schemeClr val="tx1"/>
+                </a:solidFill>
+              </a:ln>
+            </p:spPr>
+            <p:style>
+              <a:lnRef idx="2">
+                <a:schemeClr val="accent1">
+                  <a:shade val="50000"/>
+                </a:schemeClr>
+              </a:lnRef>
+              <a:fillRef idx="1">
+                <a:schemeClr val="accent1"/>
+              </a:fillRef>
+              <a:effectRef idx="0">
+                <a:schemeClr val="accent1"/>
+              </a:effectRef>
+              <a:fontRef idx="minor">
+                <a:schemeClr val="lt1"/>
+              </a:fontRef>
+            </p:style>
+            <p:txBody>
+              <a:bodyPr rtlCol="0" anchor="ctr"/>
+              <a:lstStyle/>
+              <a:p>
+                <a:pPr algn="ctr"/>
+                <a:endParaRPr lang="fr-FR"/>
+              </a:p>
+            </p:txBody>
+          </p:sp>
+          <p:sp>
+            <p:nvSpPr>
+              <p:cNvPr id="94" name="TextBox 93"/>
+              <p:cNvSpPr txBox="1"/>
+              <p:nvPr/>
+            </p:nvSpPr>
+            <p:spPr>
+              <a:xfrm>
+                <a:off x="6962036" y="914400"/>
+                <a:ext cx="1247329" cy="523220"/>
+              </a:xfrm>
+              <a:prstGeom prst="rect">
+                <a:avLst/>
+              </a:prstGeom>
+              <a:noFill/>
+            </p:spPr>
+            <p:txBody>
+              <a:bodyPr wrap="none" rtlCol="0">
+                <a:spAutoFit/>
+              </a:bodyPr>
+              <a:lstStyle/>
+              <a:p>
+                <a:pPr algn="ctr"/>
+                <a:r>
+                  <a:rPr lang="en-US" sz="1400" b="1" dirty="0" smtClean="0"/>
+                  <a:t>NO RESPONSE</a:t>
+                </a:r>
+              </a:p>
+              <a:p>
+                <a:pPr algn="ctr"/>
+                <a:r>
+                  <a:rPr lang="en-US" sz="1400" dirty="0" smtClean="0"/>
+                  <a:t>Aborted trial</a:t>
+                </a:r>
+              </a:p>
+            </p:txBody>
+          </p:sp>
+        </p:grpSp>
+      </p:grpSp>
+      <p:grpSp>
+        <p:nvGrpSpPr>
+          <p:cNvPr id="12" name="Group 11"/>
+          <p:cNvGrpSpPr/>
+          <p:nvPr/>
+        </p:nvGrpSpPr>
+        <p:grpSpPr>
+          <a:xfrm>
+            <a:off x="1253473" y="2819400"/>
+            <a:ext cx="1416099" cy="2614007"/>
+            <a:chOff x="1253473" y="2819400"/>
+            <a:chExt cx="1416099" cy="2614007"/>
+          </a:xfrm>
+        </p:grpSpPr>
+        <p:cxnSp>
+          <p:nvCxnSpPr>
+            <p:cNvPr id="31" name="Straight Connector 30"/>
+            <p:cNvCxnSpPr/>
+            <p:nvPr/>
+          </p:nvCxnSpPr>
+          <p:spPr>
+            <a:xfrm>
+              <a:off x="1524000" y="5281007"/>
+              <a:ext cx="0" cy="152400"/>
+            </a:xfrm>
+            <a:prstGeom prst="line">
+              <a:avLst/>
+            </a:prstGeom>
+            <a:ln w="38100">
+              <a:solidFill>
+                <a:schemeClr val="tx1"/>
+              </a:solidFill>
+            </a:ln>
+          </p:spPr>
+          <p:style>
+            <a:lnRef idx="1">
+              <a:schemeClr val="accent1"/>
+            </a:lnRef>
+            <a:fillRef idx="0">
+              <a:schemeClr val="accent1"/>
+            </a:fillRef>
+            <a:effectRef idx="0">
+              <a:schemeClr val="accent1"/>
+            </a:effectRef>
+            <a:fontRef idx="minor">
+              <a:schemeClr val="tx1"/>
+            </a:fontRef>
+          </p:style>
+        </p:cxnSp>
+        <p:grpSp>
+          <p:nvGrpSpPr>
+            <p:cNvPr id="3" name="Group 2"/>
+            <p:cNvGrpSpPr/>
+            <p:nvPr/>
+          </p:nvGrpSpPr>
+          <p:grpSpPr>
+            <a:xfrm>
+              <a:off x="1253473" y="2819400"/>
+              <a:ext cx="1416099" cy="2614007"/>
+              <a:chOff x="1024873" y="2819400"/>
+              <a:chExt cx="1416099" cy="2614007"/>
+            </a:xfrm>
+          </p:grpSpPr>
+          <p:sp>
+            <p:nvSpPr>
+              <p:cNvPr id="27" name="Rectangle 26"/>
+              <p:cNvSpPr/>
+              <p:nvPr/>
+            </p:nvSpPr>
+            <p:spPr>
+              <a:xfrm>
+                <a:off x="1297972" y="2819400"/>
+                <a:ext cx="1143000" cy="798731"/>
               </a:xfrm>
               <a:prstGeom prst="rect">
                 <a:avLst/>
@@ -7365,14 +7715,14 @@
           </p:sp>
           <p:sp>
             <p:nvSpPr>
-              <p:cNvPr id="13" name="TextBox 12"/>
+              <p:cNvPr id="2049" name="TextBox 2048"/>
               <p:cNvSpPr txBox="1"/>
               <p:nvPr/>
             </p:nvSpPr>
             <p:spPr>
               <a:xfrm>
-                <a:off x="7734696" y="1066800"/>
-                <a:ext cx="418704" cy="369332"/>
+                <a:off x="1024873" y="4955788"/>
+                <a:ext cx="1032527" cy="307777"/>
               </a:xfrm>
               <a:prstGeom prst="rect">
                 <a:avLst/>
@@ -7386,30 +7736,239 @@
               <a:lstStyle/>
               <a:p>
                 <a:r>
-                  <a:rPr lang="en-US" b="1" dirty="0" smtClean="0"/>
-                  <a:t>$$</a:t>
+                  <a:rPr lang="en-US" sz="1400" b="1" dirty="0" smtClean="0"/>
+                  <a:t>DETECTION</a:t>
                 </a:r>
-                <a:endParaRPr lang="fr-FR" b="1" dirty="0"/>
+                <a:endParaRPr lang="fr-FR" sz="1400" b="1" dirty="0"/>
+              </a:p>
+            </p:txBody>
+          </p:sp>
+          <p:cxnSp>
+            <p:nvCxnSpPr>
+              <p:cNvPr id="34" name="Straight Connector 33"/>
+              <p:cNvCxnSpPr/>
+              <p:nvPr/>
+            </p:nvCxnSpPr>
+            <p:spPr>
+              <a:xfrm flipH="1">
+                <a:off x="1287698" y="3602381"/>
+                <a:ext cx="5137" cy="1831026"/>
+              </a:xfrm>
+              <a:prstGeom prst="line">
+                <a:avLst/>
+              </a:prstGeom>
+              <a:ln>
+                <a:solidFill>
+                  <a:schemeClr val="bg1">
+                    <a:lumMod val="75000"/>
+                  </a:schemeClr>
+                </a:solidFill>
+              </a:ln>
+            </p:spPr>
+            <p:style>
+              <a:lnRef idx="1">
+                <a:schemeClr val="accent1"/>
+              </a:lnRef>
+              <a:fillRef idx="0">
+                <a:schemeClr val="accent1"/>
+              </a:fillRef>
+              <a:effectRef idx="0">
+                <a:schemeClr val="accent1"/>
+              </a:effectRef>
+              <a:fontRef idx="minor">
+                <a:schemeClr val="tx1"/>
+              </a:fontRef>
+            </p:style>
+          </p:cxnSp>
+          <p:sp>
+            <p:nvSpPr>
+              <p:cNvPr id="103" name="Rectangle 102"/>
+              <p:cNvSpPr/>
+              <p:nvPr/>
+            </p:nvSpPr>
+            <p:spPr>
+              <a:xfrm>
+                <a:off x="1651146" y="3047999"/>
+                <a:ext cx="457200" cy="341531"/>
+              </a:xfrm>
+              <a:prstGeom prst="rect">
+                <a:avLst/>
+              </a:prstGeom>
+              <a:solidFill>
+                <a:schemeClr val="tx1"/>
+              </a:solidFill>
+              <a:ln>
+                <a:solidFill>
+                  <a:schemeClr val="tx1"/>
+                </a:solidFill>
+              </a:ln>
+            </p:spPr>
+            <p:style>
+              <a:lnRef idx="2">
+                <a:schemeClr val="accent1">
+                  <a:shade val="50000"/>
+                </a:schemeClr>
+              </a:lnRef>
+              <a:fillRef idx="1">
+                <a:schemeClr val="accent1"/>
+              </a:fillRef>
+              <a:effectRef idx="0">
+                <a:schemeClr val="accent1"/>
+              </a:effectRef>
+              <a:fontRef idx="minor">
+                <a:schemeClr val="lt1"/>
+              </a:fontRef>
+            </p:style>
+            <p:txBody>
+              <a:bodyPr rtlCol="0" anchor="ctr"/>
+              <a:lstStyle/>
+              <a:p>
+                <a:pPr algn="ctr"/>
+                <a:endParaRPr lang="fr-FR"/>
+              </a:p>
+            </p:txBody>
+          </p:sp>
+        </p:grpSp>
+      </p:grpSp>
+      <p:grpSp>
+        <p:nvGrpSpPr>
+          <p:cNvPr id="8" name="Group 7"/>
+          <p:cNvGrpSpPr/>
+          <p:nvPr/>
+        </p:nvGrpSpPr>
+        <p:grpSpPr>
+          <a:xfrm>
+            <a:off x="5029200" y="2286000"/>
+            <a:ext cx="1341265" cy="3139871"/>
+            <a:chOff x="4692696" y="2286000"/>
+            <a:chExt cx="1341265" cy="3139871"/>
+          </a:xfrm>
+        </p:grpSpPr>
+        <p:grpSp>
+          <p:nvGrpSpPr>
+            <p:cNvPr id="47" name="Group 46"/>
+            <p:cNvGrpSpPr/>
+            <p:nvPr/>
+          </p:nvGrpSpPr>
+          <p:grpSpPr>
+            <a:xfrm>
+              <a:off x="4692696" y="2286000"/>
+              <a:ext cx="1341265" cy="1295400"/>
+              <a:chOff x="4697668" y="2286000"/>
+              <a:chExt cx="1341265" cy="1295400"/>
+            </a:xfrm>
+          </p:grpSpPr>
+          <p:sp>
+            <p:nvSpPr>
+              <p:cNvPr id="88" name="Rectangle 87"/>
+              <p:cNvSpPr/>
+              <p:nvPr/>
+            </p:nvSpPr>
+            <p:spPr>
+              <a:xfrm>
+                <a:off x="4800600" y="2782669"/>
+                <a:ext cx="1143000" cy="798731"/>
+              </a:xfrm>
+              <a:prstGeom prst="rect">
+                <a:avLst/>
+              </a:prstGeom>
+              <a:solidFill>
+                <a:schemeClr val="tx1"/>
+              </a:solidFill>
+              <a:ln>
+                <a:solidFill>
+                  <a:schemeClr val="tx1"/>
+                </a:solidFill>
+              </a:ln>
+            </p:spPr>
+            <p:style>
+              <a:lnRef idx="2">
+                <a:schemeClr val="accent1">
+                  <a:shade val="50000"/>
+                </a:schemeClr>
+              </a:lnRef>
+              <a:fillRef idx="1">
+                <a:schemeClr val="accent1"/>
+              </a:fillRef>
+              <a:effectRef idx="0">
+                <a:schemeClr val="accent1"/>
+              </a:effectRef>
+              <a:fontRef idx="minor">
+                <a:schemeClr val="lt1"/>
+              </a:fontRef>
+            </p:style>
+            <p:txBody>
+              <a:bodyPr rtlCol="0" anchor="ctr"/>
+              <a:lstStyle/>
+              <a:p>
+                <a:pPr algn="ctr"/>
+                <a:endParaRPr lang="fr-FR"/>
+              </a:p>
+            </p:txBody>
+          </p:sp>
+          <p:sp>
+            <p:nvSpPr>
+              <p:cNvPr id="96" name="TextBox 95"/>
+              <p:cNvSpPr txBox="1"/>
+              <p:nvPr/>
+            </p:nvSpPr>
+            <p:spPr>
+              <a:xfrm>
+                <a:off x="4697668" y="2286000"/>
+                <a:ext cx="1341265" cy="523220"/>
+              </a:xfrm>
+              <a:prstGeom prst="rect">
+                <a:avLst/>
+              </a:prstGeom>
+              <a:noFill/>
+            </p:spPr>
+            <p:txBody>
+              <a:bodyPr wrap="none" rtlCol="0">
+                <a:spAutoFit/>
+              </a:bodyPr>
+              <a:lstStyle/>
+              <a:p>
+                <a:pPr algn="ctr"/>
+                <a:r>
+                  <a:rPr lang="en-US" sz="1400" b="1" dirty="0" smtClean="0"/>
+                  <a:t>CORRECT </a:t>
+                </a:r>
+              </a:p>
+              <a:p>
+                <a:pPr algn="ctr"/>
+                <a:r>
+                  <a:rPr lang="en-US" sz="1400" dirty="0"/>
+                  <a:t>2</a:t>
+                </a:r>
+                <a:r>
+                  <a:rPr lang="en-US" sz="1400" dirty="0" smtClean="0"/>
+                  <a:t>-s black screen</a:t>
+                </a:r>
               </a:p>
             </p:txBody>
           </p:sp>
         </p:grpSp>
         <p:cxnSp>
           <p:nvCxnSpPr>
-            <p:cNvPr id="17" name="Straight Arrow Connector 16"/>
+            <p:cNvPr id="104" name="Straight Connector 103"/>
             <p:cNvCxnSpPr/>
             <p:nvPr/>
           </p:nvCxnSpPr>
           <p:spPr>
-            <a:xfrm>
-              <a:off x="6553200" y="2990165"/>
-              <a:ext cx="457200" cy="0"/>
+            <a:xfrm flipH="1">
+              <a:off x="4790326" y="3571126"/>
+              <a:ext cx="10274" cy="1854745"/>
             </a:xfrm>
-            <a:prstGeom prst="straightConnector1">
+            <a:prstGeom prst="line">
               <a:avLst/>
             </a:prstGeom>
             <a:ln>
-              <a:tailEnd type="arrow"/>
+              <a:solidFill>
+                <a:schemeClr val="bg1">
+                  <a:lumMod val="75000"/>
+                </a:schemeClr>
+              </a:solidFill>
+              <a:prstDash val="sysDash"/>
             </a:ln>
           </p:spPr>
           <p:style>
@@ -7427,115 +7986,142 @@
             </a:fontRef>
           </p:style>
         </p:cxnSp>
-        <p:sp>
-          <p:nvSpPr>
-            <p:cNvPr id="20" name="TextBox 19"/>
-            <p:cNvSpPr txBox="1"/>
-            <p:nvPr/>
-          </p:nvSpPr>
-          <p:spPr>
-            <a:xfrm>
-              <a:off x="6477000" y="2983468"/>
-              <a:ext cx="542136" cy="369332"/>
-            </a:xfrm>
-            <a:prstGeom prst="rect">
-              <a:avLst/>
-            </a:prstGeom>
-            <a:noFill/>
-          </p:spPr>
-          <p:txBody>
-            <a:bodyPr wrap="none" rtlCol="0">
-              <a:spAutoFit/>
-            </a:bodyPr>
-            <a:lstStyle/>
-            <a:p>
-              <a:r>
-                <a:rPr lang="en-US" dirty="0" smtClean="0"/>
-                <a:t>OUI</a:t>
-              </a:r>
-              <a:endParaRPr lang="fr-FR" dirty="0"/>
-            </a:p>
-          </p:txBody>
-        </p:sp>
       </p:grpSp>
       <p:grpSp>
         <p:nvGrpSpPr>
-          <p:cNvPr id="23" name="Group 22"/>
+          <p:cNvPr id="10" name="Group 9"/>
           <p:cNvGrpSpPr/>
           <p:nvPr/>
         </p:nvGrpSpPr>
         <p:grpSpPr>
           <a:xfrm>
-            <a:off x="6477000" y="3962400"/>
-            <a:ext cx="2552700" cy="1676400"/>
-            <a:chOff x="6477000" y="3962400"/>
-            <a:chExt cx="2552700" cy="1676400"/>
+            <a:off x="3116602" y="924580"/>
+            <a:ext cx="1455398" cy="4511565"/>
+            <a:chOff x="2864863" y="924580"/>
+            <a:chExt cx="1455398" cy="4511565"/>
           </a:xfrm>
         </p:grpSpPr>
-        <p:sp>
-          <p:nvSpPr>
-            <p:cNvPr id="11" name="Rectangle 10"/>
-            <p:cNvSpPr/>
+        <p:grpSp>
+          <p:nvGrpSpPr>
+            <p:cNvPr id="46" name="Group 45"/>
+            <p:cNvGrpSpPr/>
             <p:nvPr/>
-          </p:nvSpPr>
-          <p:spPr>
+          </p:nvGrpSpPr>
+          <p:grpSpPr>
             <a:xfrm>
-              <a:off x="7124700" y="4038600"/>
-              <a:ext cx="1905000" cy="1143000"/>
+              <a:off x="2864863" y="924580"/>
+              <a:ext cx="1455398" cy="1334869"/>
+              <a:chOff x="2864863" y="961312"/>
+              <a:chExt cx="1455398" cy="1334869"/>
             </a:xfrm>
-            <a:prstGeom prst="rect">
-              <a:avLst/>
-            </a:prstGeom>
-            <a:solidFill>
-              <a:schemeClr val="tx1"/>
-            </a:solidFill>
-            <a:ln>
+          </p:grpSpPr>
+          <p:sp>
+            <p:nvSpPr>
+              <p:cNvPr id="87" name="Rectangle 86"/>
+              <p:cNvSpPr/>
+              <p:nvPr/>
+            </p:nvSpPr>
+            <p:spPr>
+              <a:xfrm>
+                <a:off x="3025304" y="1497450"/>
+                <a:ext cx="1143000" cy="798731"/>
+              </a:xfrm>
+              <a:prstGeom prst="rect">
+                <a:avLst/>
+              </a:prstGeom>
               <a:solidFill>
-                <a:schemeClr val="tx1"/>
+                <a:srgbClr val="00B050"/>
               </a:solidFill>
-            </a:ln>
-          </p:spPr>
-          <p:style>
-            <a:lnRef idx="2">
-              <a:schemeClr val="accent1">
-                <a:shade val="50000"/>
-              </a:schemeClr>
-            </a:lnRef>
-            <a:fillRef idx="1">
-              <a:schemeClr val="accent1"/>
-            </a:fillRef>
-            <a:effectRef idx="0">
-              <a:schemeClr val="accent1"/>
-            </a:effectRef>
-            <a:fontRef idx="minor">
-              <a:schemeClr val="lt1"/>
-            </a:fontRef>
-          </p:style>
-          <p:txBody>
-            <a:bodyPr rtlCol="0" anchor="ctr"/>
-            <a:lstStyle/>
-            <a:p>
-              <a:pPr algn="ctr"/>
-              <a:endParaRPr lang="fr-FR"/>
-            </a:p>
-          </p:txBody>
-        </p:sp>
+              <a:ln>
+                <a:solidFill>
+                  <a:schemeClr val="tx1"/>
+                </a:solidFill>
+              </a:ln>
+            </p:spPr>
+            <p:style>
+              <a:lnRef idx="2">
+                <a:schemeClr val="accent1">
+                  <a:shade val="50000"/>
+                </a:schemeClr>
+              </a:lnRef>
+              <a:fillRef idx="1">
+                <a:schemeClr val="accent1"/>
+              </a:fillRef>
+              <a:effectRef idx="0">
+                <a:schemeClr val="accent1"/>
+              </a:effectRef>
+              <a:fontRef idx="minor">
+                <a:schemeClr val="lt1"/>
+              </a:fontRef>
+            </p:style>
+            <p:txBody>
+              <a:bodyPr rtlCol="0" anchor="ctr"/>
+              <a:lstStyle/>
+              <a:p>
+                <a:pPr algn="ctr"/>
+                <a:endParaRPr lang="fr-FR"/>
+              </a:p>
+            </p:txBody>
+          </p:sp>
+          <p:sp>
+            <p:nvSpPr>
+              <p:cNvPr id="92" name="TextBox 91"/>
+              <p:cNvSpPr txBox="1"/>
+              <p:nvPr/>
+            </p:nvSpPr>
+            <p:spPr>
+              <a:xfrm>
+                <a:off x="2864863" y="961312"/>
+                <a:ext cx="1455398" cy="523220"/>
+              </a:xfrm>
+              <a:prstGeom prst="rect">
+                <a:avLst/>
+              </a:prstGeom>
+              <a:noFill/>
+            </p:spPr>
+            <p:txBody>
+              <a:bodyPr wrap="none" rtlCol="0">
+                <a:spAutoFit/>
+              </a:bodyPr>
+              <a:lstStyle/>
+              <a:p>
+                <a:pPr algn="ctr"/>
+                <a:r>
+                  <a:rPr lang="en-US" sz="1400" b="1" dirty="0" smtClean="0"/>
+                  <a:t>EARLY RESPONSE</a:t>
+                </a:r>
+              </a:p>
+              <a:p>
+                <a:pPr algn="ctr"/>
+                <a:r>
+                  <a:rPr lang="en-US" sz="1400" dirty="0" smtClean="0"/>
+                  <a:t>2-s timeout</a:t>
+                </a:r>
+              </a:p>
+            </p:txBody>
+          </p:sp>
+        </p:grpSp>
         <p:cxnSp>
           <p:nvCxnSpPr>
-            <p:cNvPr id="19" name="Straight Arrow Connector 18"/>
+            <p:cNvPr id="36" name="Straight Connector 35"/>
             <p:cNvCxnSpPr/>
             <p:nvPr/>
           </p:nvCxnSpPr>
           <p:spPr>
             <a:xfrm>
-              <a:off x="6553200" y="3962400"/>
-              <a:ext cx="457200" cy="647700"/>
+              <a:off x="3017178" y="2133600"/>
+              <a:ext cx="0" cy="3302545"/>
             </a:xfrm>
-            <a:prstGeom prst="straightConnector1">
+            <a:prstGeom prst="line">
               <a:avLst/>
             </a:prstGeom>
             <a:ln>
-              <a:tailEnd type="arrow"/>
+              <a:solidFill>
+                <a:schemeClr val="bg1">
+                  <a:lumMod val="75000"/>
+                </a:schemeClr>
+              </a:solidFill>
+              <a:prstDash val="sysDash"/>
             </a:ln>
           </p:spPr>
           <p:style>
@@ -7553,159 +8139,363 @@
             </a:fontRef>
           </p:style>
         </p:cxnSp>
-        <p:sp>
-          <p:nvSpPr>
-            <p:cNvPr id="21" name="TextBox 20"/>
-            <p:cNvSpPr txBox="1"/>
-            <p:nvPr/>
-          </p:nvSpPr>
-          <p:spPr>
-            <a:xfrm>
-              <a:off x="6477000" y="4583668"/>
-              <a:ext cx="635110" cy="369332"/>
-            </a:xfrm>
-            <a:prstGeom prst="rect">
-              <a:avLst/>
-            </a:prstGeom>
+      </p:grpSp>
+      <p:pic>
+        <p:nvPicPr>
+          <p:cNvPr id="1026" name="Picture 2"/>
+          <p:cNvPicPr>
+            <a:picLocks noChangeAspect="1" noChangeArrowheads="1"/>
+          </p:cNvPicPr>
+          <p:nvPr/>
+        </p:nvPicPr>
+        <p:blipFill>
+          <a:blip r:embed="rId3" cstate="print">
+            <a:extLst>
+              <a:ext uri="{28A0092B-C50C-407E-A947-70E740481C1C}">
+                <a14:useLocalDpi xmlns:a14="http://schemas.microsoft.com/office/drawing/2010/main" val="0"/>
+              </a:ext>
+            </a:extLst>
+          </a:blip>
+          <a:srcRect/>
+          <a:stretch>
+            <a:fillRect/>
+          </a:stretch>
+        </p:blipFill>
+        <p:spPr bwMode="auto">
+          <a:xfrm>
+            <a:off x="3737872" y="3889121"/>
+            <a:ext cx="986527" cy="783626"/>
+          </a:xfrm>
+          <a:prstGeom prst="rect">
+            <a:avLst/>
+          </a:prstGeom>
+          <a:noFill/>
+          <a:ln>
             <a:noFill/>
-          </p:spPr>
-          <p:txBody>
-            <a:bodyPr wrap="none" rtlCol="0">
-              <a:spAutoFit/>
-            </a:bodyPr>
-            <a:lstStyle/>
-            <a:p>
-              <a:r>
-                <a:rPr lang="en-US" dirty="0" smtClean="0"/>
-                <a:t>NON</a:t>
-              </a:r>
-              <a:endParaRPr lang="fr-FR" dirty="0"/>
-            </a:p>
-          </p:txBody>
-        </p:sp>
-        <p:sp>
-          <p:nvSpPr>
-            <p:cNvPr id="22" name="TextBox 21"/>
-            <p:cNvSpPr txBox="1"/>
-            <p:nvPr/>
-          </p:nvSpPr>
-          <p:spPr>
-            <a:xfrm>
-              <a:off x="7456976" y="5269468"/>
-              <a:ext cx="1229824" cy="369332"/>
-            </a:xfrm>
-            <a:prstGeom prst="rect">
-              <a:avLst/>
-            </a:prstGeom>
+          </a:ln>
+          <a:effectLst/>
+          <a:extLst>
+            <a:ext uri="{909E8E84-426E-40DD-AFC4-6F175D3DCCD1}">
+              <a14:hiddenFill xmlns:a14="http://schemas.microsoft.com/office/drawing/2010/main">
+                <a:solidFill>
+                  <a:schemeClr val="accent1"/>
+                </a:solidFill>
+              </a14:hiddenFill>
+            </a:ext>
+            <a:ext uri="{91240B29-F687-4F45-9708-019B960494DF}">
+              <a14:hiddenLine xmlns:a14="http://schemas.microsoft.com/office/drawing/2010/main" w="9525">
+                <a:solidFill>
+                  <a:schemeClr val="tx1"/>
+                </a:solidFill>
+                <a:miter lim="800000"/>
+                <a:headEnd/>
+                <a:tailEnd/>
+              </a14:hiddenLine>
+            </a:ext>
+            <a:ext uri="{AF507438-7753-43E0-B8FC-AC1667EBCBE1}">
+              <a14:hiddenEffects xmlns:a14="http://schemas.microsoft.com/office/drawing/2010/main">
+                <a:effectLst>
+                  <a:outerShdw dist="35921" dir="2700000" algn="ctr" rotWithShape="0">
+                    <a:schemeClr val="bg2"/>
+                  </a:outerShdw>
+                </a:effectLst>
+              </a14:hiddenEffects>
+            </a:ext>
+          </a:extLst>
+        </p:spPr>
+      </p:pic>
+      <p:pic>
+        <p:nvPicPr>
+          <p:cNvPr id="58" name="Picture 2"/>
+          <p:cNvPicPr>
+            <a:picLocks noChangeAspect="1" noChangeArrowheads="1"/>
+          </p:cNvPicPr>
+          <p:nvPr/>
+        </p:nvPicPr>
+        <p:blipFill>
+          <a:blip r:embed="rId3" cstate="print">
+            <a:extLst>
+              <a:ext uri="{28A0092B-C50C-407E-A947-70E740481C1C}">
+                <a14:useLocalDpi xmlns:a14="http://schemas.microsoft.com/office/drawing/2010/main" val="0"/>
+              </a:ext>
+            </a:extLst>
+          </a:blip>
+          <a:srcRect/>
+          <a:stretch>
+            <a:fillRect/>
+          </a:stretch>
+        </p:blipFill>
+        <p:spPr bwMode="auto">
+          <a:xfrm>
+            <a:off x="2730798" y="3886200"/>
+            <a:ext cx="986527" cy="783626"/>
+          </a:xfrm>
+          <a:prstGeom prst="rect">
+            <a:avLst/>
+          </a:prstGeom>
+          <a:noFill/>
+          <a:ln>
             <a:noFill/>
-          </p:spPr>
-          <p:txBody>
-            <a:bodyPr wrap="none" rtlCol="0">
-              <a:spAutoFit/>
-            </a:bodyPr>
-            <a:lstStyle/>
-            <a:p>
-              <a:r>
-                <a:rPr lang="en-US" dirty="0" smtClean="0"/>
-                <a:t>Timeout 3s</a:t>
-              </a:r>
-              <a:endParaRPr lang="fr-FR" dirty="0"/>
-            </a:p>
-          </p:txBody>
-        </p:sp>
-      </p:grpSp>
+          </a:ln>
+          <a:effectLst/>
+          <a:extLst>
+            <a:ext uri="{909E8E84-426E-40DD-AFC4-6F175D3DCCD1}">
+              <a14:hiddenFill xmlns:a14="http://schemas.microsoft.com/office/drawing/2010/main">
+                <a:solidFill>
+                  <a:schemeClr val="accent1"/>
+                </a:solidFill>
+              </a14:hiddenFill>
+            </a:ext>
+            <a:ext uri="{91240B29-F687-4F45-9708-019B960494DF}">
+              <a14:hiddenLine xmlns:a14="http://schemas.microsoft.com/office/drawing/2010/main" w="9525">
+                <a:solidFill>
+                  <a:schemeClr val="tx1"/>
+                </a:solidFill>
+                <a:miter lim="800000"/>
+                <a:headEnd/>
+                <a:tailEnd/>
+              </a14:hiddenLine>
+            </a:ext>
+            <a:ext uri="{AF507438-7753-43E0-B8FC-AC1667EBCBE1}">
+              <a14:hiddenEffects xmlns:a14="http://schemas.microsoft.com/office/drawing/2010/main">
+                <a:effectLst>
+                  <a:outerShdw dist="35921" dir="2700000" algn="ctr" rotWithShape="0">
+                    <a:schemeClr val="bg2"/>
+                  </a:outerShdw>
+                </a:effectLst>
+              </a14:hiddenEffects>
+            </a:ext>
+          </a:extLst>
+        </p:spPr>
+      </p:pic>
       <p:grpSp>
         <p:nvGrpSpPr>
-          <p:cNvPr id="5" name="Group 4"/>
+          <p:cNvPr id="2" name="Group 1"/>
           <p:cNvGrpSpPr/>
           <p:nvPr/>
         </p:nvGrpSpPr>
         <p:grpSpPr>
           <a:xfrm>
-            <a:off x="2514601" y="3886200"/>
-            <a:ext cx="3352800" cy="1447219"/>
-            <a:chOff x="2514601" y="3886200"/>
-            <a:chExt cx="3352800" cy="1447219"/>
+            <a:off x="4200838" y="3886200"/>
+            <a:ext cx="1537703" cy="1564757"/>
+            <a:chOff x="4200838" y="3886200"/>
+            <a:chExt cx="1537703" cy="1564757"/>
           </a:xfrm>
         </p:grpSpPr>
-        <p:pic>
-          <p:nvPicPr>
-            <p:cNvPr id="1026" name="Picture 2">
-              <a:hlinkClick r:id="" action="ppaction://noaction">
-                <a:snd r:embed="rId3" name="Séquence Go-Nogo 5 coos.wav"/>
-              </a:hlinkClick>
-            </p:cNvPr>
-            <p:cNvPicPr>
-              <a:picLocks noChangeAspect="1" noChangeArrowheads="1"/>
-            </p:cNvPicPr>
+        <p:grpSp>
+          <p:nvGrpSpPr>
+            <p:cNvPr id="48" name="Group 47"/>
+            <p:cNvGrpSpPr/>
             <p:nvPr/>
-          </p:nvPicPr>
-          <p:blipFill>
-            <a:blip r:embed="rId4" cstate="print">
-              <a:extLst>
-                <a:ext uri="{28A0092B-C50C-407E-A947-70E740481C1C}">
-                  <a14:useLocalDpi xmlns:a14="http://schemas.microsoft.com/office/drawing/2010/main" val="0"/>
-                </a:ext>
-              </a:extLst>
-            </a:blip>
-            <a:srcRect/>
-            <a:stretch>
-              <a:fillRect/>
-            </a:stretch>
-          </p:blipFill>
-          <p:spPr bwMode="auto">
+          </p:nvGrpSpPr>
+          <p:grpSpPr>
             <a:xfrm>
-              <a:off x="2514601" y="3886200"/>
-              <a:ext cx="3352800" cy="1447219"/>
+              <a:off x="4200838" y="3887438"/>
+              <a:ext cx="1514162" cy="1563519"/>
+              <a:chOff x="2976494" y="3849469"/>
+              <a:chExt cx="1514162" cy="1563519"/>
             </a:xfrm>
-            <a:prstGeom prst="rect">
-              <a:avLst/>
-            </a:prstGeom>
-            <a:noFill/>
-            <a:ln>
+          </p:grpSpPr>
+          <p:sp>
+            <p:nvSpPr>
+              <p:cNvPr id="51" name="TextBox 50"/>
+              <p:cNvSpPr txBox="1"/>
+              <p:nvPr/>
+            </p:nvSpPr>
+            <p:spPr>
+              <a:xfrm>
+                <a:off x="2976494" y="4952811"/>
+                <a:ext cx="1363130" cy="307777"/>
+              </a:xfrm>
+              <a:prstGeom prst="rect">
+                <a:avLst/>
+              </a:prstGeom>
               <a:noFill/>
-            </a:ln>
-            <a:effectLst/>
-            <a:extLst>
-              <a:ext uri="{909E8E84-426E-40DD-AFC4-6F175D3DCCD1}">
-                <a14:hiddenFill xmlns:a14="http://schemas.microsoft.com/office/drawing/2010/main">
+            </p:spPr>
+            <p:txBody>
+              <a:bodyPr wrap="none" rtlCol="0">
+                <a:spAutoFit/>
+              </a:bodyPr>
+              <a:lstStyle/>
+              <a:p>
+                <a:r>
+                  <a:rPr lang="en-US" sz="1400" b="1" dirty="0" smtClean="0"/>
+                  <a:t> 2</a:t>
+                </a:r>
+                <a:r>
+                  <a:rPr lang="en-US" sz="1400" b="1" baseline="30000" dirty="0" smtClean="0"/>
+                  <a:t>nd</a:t>
+                </a:r>
+                <a:r>
+                  <a:rPr lang="en-US" sz="1400" b="1" dirty="0" smtClean="0"/>
+                  <a:t> COO ONSET</a:t>
+                </a:r>
+                <a:endParaRPr lang="fr-FR" sz="1400" b="1" dirty="0"/>
+              </a:p>
+            </p:txBody>
+          </p:sp>
+          <p:grpSp>
+            <p:nvGrpSpPr>
+              <p:cNvPr id="52" name="Group 51"/>
+              <p:cNvGrpSpPr/>
+              <p:nvPr/>
+            </p:nvGrpSpPr>
+            <p:grpSpPr>
+              <a:xfrm>
+                <a:off x="3503484" y="3849469"/>
+                <a:ext cx="987172" cy="1563519"/>
+                <a:chOff x="3503484" y="3849469"/>
+                <a:chExt cx="987172" cy="1563519"/>
+              </a:xfrm>
+            </p:grpSpPr>
+            <p:pic>
+              <p:nvPicPr>
+                <p:cNvPr id="56" name="Picture 2"/>
+                <p:cNvPicPr>
+                  <a:picLocks noChangeAspect="1" noChangeArrowheads="1"/>
+                </p:cNvPicPr>
+                <p:nvPr/>
+              </p:nvPicPr>
+              <p:blipFill>
+                <a:blip r:embed="rId4">
+                  <a:extLst>
+                    <a:ext uri="{28A0092B-C50C-407E-A947-70E740481C1C}">
+                      <a14:useLocalDpi xmlns:a14="http://schemas.microsoft.com/office/drawing/2010/main" val="0"/>
+                    </a:ext>
+                  </a:extLst>
+                </a:blip>
+                <a:srcRect/>
+                <a:stretch>
+                  <a:fillRect/>
+                </a:stretch>
+              </p:blipFill>
+              <p:spPr bwMode="auto">
+                <a:xfrm>
+                  <a:off x="3504740" y="3849469"/>
+                  <a:ext cx="985916" cy="798731"/>
+                </a:xfrm>
+                <a:prstGeom prst="rect">
+                  <a:avLst/>
+                </a:prstGeom>
+                <a:noFill/>
+                <a:ln>
+                  <a:noFill/>
+                </a:ln>
+                <a:effectLst/>
+                <a:extLst>
+                  <a:ext uri="{909E8E84-426E-40DD-AFC4-6F175D3DCCD1}">
+                    <a14:hiddenFill xmlns:a14="http://schemas.microsoft.com/office/drawing/2010/main">
+                      <a:solidFill>
+                        <a:schemeClr val="accent1"/>
+                      </a:solidFill>
+                    </a14:hiddenFill>
+                  </a:ext>
+                  <a:ext uri="{91240B29-F687-4F45-9708-019B960494DF}">
+                    <a14:hiddenLine xmlns:a14="http://schemas.microsoft.com/office/drawing/2010/main" w="9525">
+                      <a:solidFill>
+                        <a:schemeClr val="tx1"/>
+                      </a:solidFill>
+                      <a:miter lim="800000"/>
+                      <a:headEnd/>
+                      <a:tailEnd/>
+                    </a14:hiddenLine>
+                  </a:ext>
+                  <a:ext uri="{AF507438-7753-43E0-B8FC-AC1667EBCBE1}">
+                    <a14:hiddenEffects xmlns:a14="http://schemas.microsoft.com/office/drawing/2010/main">
+                      <a:effectLst>
+                        <a:outerShdw dist="35921" dir="2700000" algn="ctr" rotWithShape="0">
+                          <a:schemeClr val="bg2"/>
+                        </a:outerShdw>
+                      </a:effectLst>
+                    </a14:hiddenEffects>
+                  </a:ext>
+                </a:extLst>
+              </p:spPr>
+            </p:pic>
+            <p:cxnSp>
+              <p:nvCxnSpPr>
+                <p:cNvPr id="54" name="Straight Connector 53"/>
+                <p:cNvCxnSpPr/>
+                <p:nvPr/>
+              </p:nvCxnSpPr>
+              <p:spPr>
+                <a:xfrm>
+                  <a:off x="3503484" y="4648200"/>
+                  <a:ext cx="1716" cy="764788"/>
+                </a:xfrm>
+                <a:prstGeom prst="line">
+                  <a:avLst/>
+                </a:prstGeom>
+                <a:ln>
                   <a:solidFill>
-                    <a:schemeClr val="accent1"/>
+                    <a:schemeClr val="bg1">
+                      <a:lumMod val="75000"/>
+                    </a:schemeClr>
                   </a:solidFill>
-                </a14:hiddenFill>
-              </a:ext>
-              <a:ext uri="{91240B29-F687-4F45-9708-019B960494DF}">
-                <a14:hiddenLine xmlns:a14="http://schemas.microsoft.com/office/drawing/2010/main" w="9525">
+                </a:ln>
+              </p:spPr>
+              <p:style>
+                <a:lnRef idx="1">
+                  <a:schemeClr val="accent1"/>
+                </a:lnRef>
+                <a:fillRef idx="0">
+                  <a:schemeClr val="accent1"/>
+                </a:fillRef>
+                <a:effectRef idx="0">
+                  <a:schemeClr val="accent1"/>
+                </a:effectRef>
+                <a:fontRef idx="minor">
+                  <a:schemeClr val="tx1"/>
+                </a:fontRef>
+              </p:style>
+            </p:cxnSp>
+            <p:cxnSp>
+              <p:nvCxnSpPr>
+                <p:cNvPr id="55" name="Straight Connector 54"/>
+                <p:cNvCxnSpPr/>
+                <p:nvPr/>
+              </p:nvCxnSpPr>
+              <p:spPr>
+                <a:xfrm>
+                  <a:off x="3515474" y="5257800"/>
+                  <a:ext cx="0" cy="152400"/>
+                </a:xfrm>
+                <a:prstGeom prst="line">
+                  <a:avLst/>
+                </a:prstGeom>
+                <a:ln w="38100">
                   <a:solidFill>
                     <a:schemeClr val="tx1"/>
                   </a:solidFill>
-                  <a:miter lim="800000"/>
-                  <a:headEnd/>
-                  <a:tailEnd/>
-                </a14:hiddenLine>
-              </a:ext>
-              <a:ext uri="{AF507438-7753-43E0-B8FC-AC1667EBCBE1}">
-                <a14:hiddenEffects xmlns:a14="http://schemas.microsoft.com/office/drawing/2010/main">
-                  <a:effectLst>
-                    <a:outerShdw dist="35921" dir="2700000" algn="ctr" rotWithShape="0">
-                      <a:schemeClr val="bg2"/>
-                    </a:outerShdw>
-                  </a:effectLst>
-                </a14:hiddenEffects>
-              </a:ext>
-            </a:extLst>
-          </p:spPr>
-        </p:pic>
+                </a:ln>
+              </p:spPr>
+              <p:style>
+                <a:lnRef idx="1">
+                  <a:schemeClr val="accent1"/>
+                </a:lnRef>
+                <a:fillRef idx="0">
+                  <a:schemeClr val="accent1"/>
+                </a:fillRef>
+                <a:effectRef idx="0">
+                  <a:schemeClr val="accent1"/>
+                </a:effectRef>
+                <a:fontRef idx="minor">
+                  <a:schemeClr val="tx1"/>
+                </a:fontRef>
+              </p:style>
+            </p:cxnSp>
+          </p:grpSp>
+        </p:grpSp>
         <p:sp>
           <p:nvSpPr>
-            <p:cNvPr id="2" name="Rectangle 1"/>
+            <p:cNvPr id="59" name="Rectangle 58"/>
             <p:cNvSpPr/>
             <p:nvPr/>
           </p:nvSpPr>
           <p:spPr>
             <a:xfrm>
-              <a:off x="5181600" y="3886200"/>
-              <a:ext cx="685801" cy="1447219"/>
+              <a:off x="4739819" y="3886200"/>
+              <a:ext cx="998722" cy="799969"/>
             </a:xfrm>
             <a:prstGeom prst="rect">
               <a:avLst/>
@@ -7743,40 +8533,45 @@
           </p:txBody>
         </p:sp>
       </p:grpSp>
-      <p:sp>
-        <p:nvSpPr>
-          <p:cNvPr id="33" name="TextBox 32"/>
-          <p:cNvSpPr txBox="1"/>
+      <p:cxnSp>
+        <p:nvCxnSpPr>
+          <p:cNvPr id="15" name="Straight Connector 14"/>
+          <p:cNvCxnSpPr/>
           <p:nvPr/>
-        </p:nvSpPr>
+        </p:nvCxnSpPr>
         <p:spPr>
           <a:xfrm>
-            <a:off x="3633136" y="0"/>
-            <a:ext cx="1853264" cy="461665"/>
+            <a:off x="2819400" y="5298557"/>
+            <a:ext cx="0" cy="127314"/>
           </a:xfrm>
-          <a:prstGeom prst="rect">
+          <a:prstGeom prst="line">
             <a:avLst/>
           </a:prstGeom>
-          <a:noFill/>
+          <a:ln w="38100">
+            <a:solidFill>
+              <a:schemeClr val="tx1"/>
+            </a:solidFill>
+          </a:ln>
         </p:spPr>
-        <p:txBody>
-          <a:bodyPr wrap="none" rtlCol="0">
-            <a:spAutoFit/>
-          </a:bodyPr>
-          <a:lstStyle/>
-          <a:p>
-            <a:pPr algn="ctr"/>
-            <a:r>
-              <a:rPr lang="en-US" sz="2400" b="1" dirty="0" smtClean="0"/>
-              <a:t>OMM TASK 1</a:t>
-            </a:r>
-          </a:p>
-        </p:txBody>
-      </p:sp>
+        <p:style>
+          <a:lnRef idx="1">
+            <a:schemeClr val="accent1"/>
+          </a:lnRef>
+          <a:fillRef idx="0">
+            <a:schemeClr val="accent1"/>
+          </a:fillRef>
+          <a:effectRef idx="0">
+            <a:schemeClr val="accent1"/>
+          </a:effectRef>
+          <a:fontRef idx="minor">
+            <a:schemeClr val="tx1"/>
+          </a:fontRef>
+        </p:style>
+      </p:cxnSp>
     </p:spTree>
     <p:extLst>
       <p:ext uri="{BB962C8B-B14F-4D97-AF65-F5344CB8AC3E}">
-        <p14:creationId xmlns:p14="http://schemas.microsoft.com/office/powerpoint/2010/main" val="2076415668"/>
+        <p14:creationId xmlns:p14="http://schemas.microsoft.com/office/powerpoint/2010/main" val="3899774826"/>
       </p:ext>
     </p:extLst>
   </p:cSld>
@@ -7804,7 +8599,7 @@
                             </p:stCondLst>
                             <p:childTnLst>
                               <p:par>
-                                <p:cTn id="5" presetID="14" presetClass="entr" presetSubtype="10" fill="hold" grpId="0" nodeType="clickEffect">
+                                <p:cTn id="5" presetID="14" presetClass="entr" presetSubtype="10" fill="hold" nodeType="clickEffect">
                                   <p:stCondLst>
                                     <p:cond delay="0"/>
                                   </p:stCondLst>
@@ -7817,7 +8612,7 @@
                                           </p:stCondLst>
                                         </p:cTn>
                                         <p:tgtEl>
-                                          <p:spTgt spid="7"/>
+                                          <p:spTgt spid="12"/>
                                         </p:tgtEl>
                                         <p:attrNameLst>
                                           <p:attrName>style.visibility</p:attrName>
@@ -7831,7 +8626,7 @@
                                       <p:cBhvr>
                                         <p:cTn id="7" dur="500"/>
                                         <p:tgtEl>
-                                          <p:spTgt spid="7"/>
+                                          <p:spTgt spid="12"/>
                                         </p:tgtEl>
                                       </p:cBhvr>
                                     </p:animEffect>
@@ -7910,7 +8705,7 @@
                             </p:stCondLst>
                             <p:childTnLst>
                               <p:par>
-                                <p:cTn id="15" presetID="14" presetClass="entr" presetSubtype="10" fill="hold" grpId="0" nodeType="clickEffect">
+                                <p:cTn id="15" presetID="14" presetClass="entr" presetSubtype="10" fill="hold" nodeType="clickEffect">
                                   <p:stCondLst>
                                     <p:cond delay="0"/>
                                   </p:stCondLst>
@@ -7923,7 +8718,7 @@
                                           </p:stCondLst>
                                         </p:cTn>
                                         <p:tgtEl>
-                                          <p:spTgt spid="15"/>
+                                          <p:spTgt spid="58"/>
                                         </p:tgtEl>
                                         <p:attrNameLst>
                                           <p:attrName>style.visibility</p:attrName>
@@ -7937,7 +8732,7 @@
                                       <p:cBhvr>
                                         <p:cTn id="17" dur="500"/>
                                         <p:tgtEl>
-                                          <p:spTgt spid="15"/>
+                                          <p:spTgt spid="58"/>
                                         </p:tgtEl>
                                       </p:cBhvr>
                                     </p:animEffect>
@@ -7976,7 +8771,7 @@
                                           </p:stCondLst>
                                         </p:cTn>
                                         <p:tgtEl>
-                                          <p:spTgt spid="24"/>
+                                          <p:spTgt spid="1026"/>
                                         </p:tgtEl>
                                         <p:attrNameLst>
                                           <p:attrName>style.visibility</p:attrName>
@@ -7990,7 +8785,7 @@
                                       <p:cBhvr>
                                         <p:cTn id="22" dur="500"/>
                                         <p:tgtEl>
-                                          <p:spTgt spid="24"/>
+                                          <p:spTgt spid="1026"/>
                                         </p:tgtEl>
                                       </p:cBhvr>
                                     </p:animEffect>
@@ -8029,7 +8824,7 @@
                                           </p:stCondLst>
                                         </p:cTn>
                                         <p:tgtEl>
-                                          <p:spTgt spid="23"/>
+                                          <p:spTgt spid="2"/>
                                         </p:tgtEl>
                                         <p:attrNameLst>
                                           <p:attrName>style.visibility</p:attrName>
@@ -8043,7 +8838,219 @@
                                       <p:cBhvr>
                                         <p:cTn id="27" dur="500"/>
                                         <p:tgtEl>
-                                          <p:spTgt spid="23"/>
+                                          <p:spTgt spid="2"/>
+                                        </p:tgtEl>
+                                      </p:cBhvr>
+                                    </p:animEffect>
+                                  </p:childTnLst>
+                                </p:cTn>
+                              </p:par>
+                            </p:childTnLst>
+                          </p:cTn>
+                        </p:par>
+                      </p:childTnLst>
+                    </p:cTn>
+                  </p:par>
+                  <p:par>
+                    <p:cTn id="28" fill="hold">
+                      <p:stCondLst>
+                        <p:cond delay="indefinite"/>
+                      </p:stCondLst>
+                      <p:childTnLst>
+                        <p:par>
+                          <p:cTn id="29" fill="hold">
+                            <p:stCondLst>
+                              <p:cond delay="0"/>
+                            </p:stCondLst>
+                            <p:childTnLst>
+                              <p:par>
+                                <p:cTn id="30" presetID="14" presetClass="entr" presetSubtype="10" fill="hold" nodeType="clickEffect">
+                                  <p:stCondLst>
+                                    <p:cond delay="0"/>
+                                  </p:stCondLst>
+                                  <p:childTnLst>
+                                    <p:set>
+                                      <p:cBhvr>
+                                        <p:cTn id="31" dur="1" fill="hold">
+                                          <p:stCondLst>
+                                            <p:cond delay="0"/>
+                                          </p:stCondLst>
+                                        </p:cTn>
+                                        <p:tgtEl>
+                                          <p:spTgt spid="6"/>
+                                        </p:tgtEl>
+                                        <p:attrNameLst>
+                                          <p:attrName>style.visibility</p:attrName>
+                                        </p:attrNameLst>
+                                      </p:cBhvr>
+                                      <p:to>
+                                        <p:strVal val="visible"/>
+                                      </p:to>
+                                    </p:set>
+                                    <p:animEffect transition="in" filter="randombar(horizontal)">
+                                      <p:cBhvr>
+                                        <p:cTn id="32" dur="500"/>
+                                        <p:tgtEl>
+                                          <p:spTgt spid="6"/>
+                                        </p:tgtEl>
+                                      </p:cBhvr>
+                                    </p:animEffect>
+                                  </p:childTnLst>
+                                </p:cTn>
+                              </p:par>
+                            </p:childTnLst>
+                          </p:cTn>
+                        </p:par>
+                      </p:childTnLst>
+                    </p:cTn>
+                  </p:par>
+                  <p:par>
+                    <p:cTn id="33" fill="hold">
+                      <p:stCondLst>
+                        <p:cond delay="indefinite"/>
+                      </p:stCondLst>
+                      <p:childTnLst>
+                        <p:par>
+                          <p:cTn id="34" fill="hold">
+                            <p:stCondLst>
+                              <p:cond delay="0"/>
+                            </p:stCondLst>
+                            <p:childTnLst>
+                              <p:par>
+                                <p:cTn id="35" presetID="14" presetClass="entr" presetSubtype="10" fill="hold" nodeType="clickEffect">
+                                  <p:stCondLst>
+                                    <p:cond delay="0"/>
+                                  </p:stCondLst>
+                                  <p:childTnLst>
+                                    <p:set>
+                                      <p:cBhvr>
+                                        <p:cTn id="36" dur="1" fill="hold">
+                                          <p:stCondLst>
+                                            <p:cond delay="0"/>
+                                          </p:stCondLst>
+                                        </p:cTn>
+                                        <p:tgtEl>
+                                          <p:spTgt spid="8"/>
+                                        </p:tgtEl>
+                                        <p:attrNameLst>
+                                          <p:attrName>style.visibility</p:attrName>
+                                        </p:attrNameLst>
+                                      </p:cBhvr>
+                                      <p:to>
+                                        <p:strVal val="visible"/>
+                                      </p:to>
+                                    </p:set>
+                                    <p:animEffect transition="in" filter="randombar(horizontal)">
+                                      <p:cBhvr>
+                                        <p:cTn id="37" dur="500"/>
+                                        <p:tgtEl>
+                                          <p:spTgt spid="8"/>
+                                        </p:tgtEl>
+                                      </p:cBhvr>
+                                    </p:animEffect>
+                                  </p:childTnLst>
+                                </p:cTn>
+                              </p:par>
+                            </p:childTnLst>
+                          </p:cTn>
+                        </p:par>
+                      </p:childTnLst>
+                    </p:cTn>
+                  </p:par>
+                  <p:par>
+                    <p:cTn id="38" fill="hold">
+                      <p:stCondLst>
+                        <p:cond delay="indefinite"/>
+                      </p:stCondLst>
+                      <p:childTnLst>
+                        <p:par>
+                          <p:cTn id="39" fill="hold">
+                            <p:stCondLst>
+                              <p:cond delay="0"/>
+                            </p:stCondLst>
+                            <p:childTnLst>
+                              <p:par>
+                                <p:cTn id="40" presetID="14" presetClass="entr" presetSubtype="10" fill="hold" nodeType="clickEffect">
+                                  <p:stCondLst>
+                                    <p:cond delay="0"/>
+                                  </p:stCondLst>
+                                  <p:childTnLst>
+                                    <p:set>
+                                      <p:cBhvr>
+                                        <p:cTn id="41" dur="1" fill="hold">
+                                          <p:stCondLst>
+                                            <p:cond delay="0"/>
+                                          </p:stCondLst>
+                                        </p:cTn>
+                                        <p:tgtEl>
+                                          <p:spTgt spid="10"/>
+                                        </p:tgtEl>
+                                        <p:attrNameLst>
+                                          <p:attrName>style.visibility</p:attrName>
+                                        </p:attrNameLst>
+                                      </p:cBhvr>
+                                      <p:to>
+                                        <p:strVal val="visible"/>
+                                      </p:to>
+                                    </p:set>
+                                    <p:animEffect transition="in" filter="randombar(horizontal)">
+                                      <p:cBhvr>
+                                        <p:cTn id="42" dur="500"/>
+                                        <p:tgtEl>
+                                          <p:spTgt spid="10"/>
+                                        </p:tgtEl>
+                                      </p:cBhvr>
+                                    </p:animEffect>
+                                  </p:childTnLst>
+                                </p:cTn>
+                              </p:par>
+                            </p:childTnLst>
+                          </p:cTn>
+                        </p:par>
+                      </p:childTnLst>
+                    </p:cTn>
+                  </p:par>
+                  <p:par>
+                    <p:cTn id="43" fill="hold">
+                      <p:stCondLst>
+                        <p:cond delay="indefinite"/>
+                      </p:stCondLst>
+                      <p:childTnLst>
+                        <p:par>
+                          <p:cTn id="44" fill="hold">
+                            <p:stCondLst>
+                              <p:cond delay="0"/>
+                            </p:stCondLst>
+                            <p:childTnLst>
+                              <p:par>
+                                <p:cTn id="45" presetID="14" presetClass="entr" presetSubtype="10" fill="hold" nodeType="clickEffect">
+                                  <p:stCondLst>
+                                    <p:cond delay="0"/>
+                                  </p:stCondLst>
+                                  <p:childTnLst>
+                                    <p:set>
+                                      <p:cBhvr>
+                                        <p:cTn id="46" dur="1" fill="hold">
+                                          <p:stCondLst>
+                                            <p:cond delay="0"/>
+                                          </p:stCondLst>
+                                        </p:cTn>
+                                        <p:tgtEl>
+                                          <p:spTgt spid="11"/>
+                                        </p:tgtEl>
+                                        <p:attrNameLst>
+                                          <p:attrName>style.visibility</p:attrName>
+                                        </p:attrNameLst>
+                                      </p:cBhvr>
+                                      <p:to>
+                                        <p:strVal val="visible"/>
+                                      </p:to>
+                                    </p:set>
+                                    <p:animEffect transition="in" filter="randombar(horizontal)">
+                                      <p:cBhvr>
+                                        <p:cTn id="47" dur="500"/>
+                                        <p:tgtEl>
+                                          <p:spTgt spid="11"/>
                                         </p:tgtEl>
                                       </p:cBhvr>
                                     </p:animEffect>
@@ -8073,1750 +9080,13 @@
                 </p:cond>
               </p:nextCondLst>
             </p:seq>
+            <p:par>
+              <p:cTn id="48"/>
+            </p:par>
           </p:childTnLst>
         </p:cTn>
       </p:par>
     </p:tnLst>
-    <p:bldLst>
-      <p:bldP spid="7" grpId="0" animBg="1"/>
-      <p:bldP spid="15" grpId="0"/>
-    </p:bldLst>
-  </p:timing>
-</p:sld>
-</file>
-
-<file path=ppt/slides/slide4.xml><?xml version="1.0" encoding="utf-8"?>
-<p:sld xmlns:a="http://schemas.openxmlformats.org/drawingml/2006/main" xmlns:r="http://schemas.openxmlformats.org/officeDocument/2006/relationships" xmlns:p="http://schemas.openxmlformats.org/presentationml/2006/main">
-  <p:cSld>
-    <p:spTree>
-      <p:nvGrpSpPr>
-        <p:cNvPr id="1" name=""/>
-        <p:cNvGrpSpPr/>
-        <p:nvPr/>
-      </p:nvGrpSpPr>
-      <p:grpSpPr>
-        <a:xfrm>
-          <a:off x="0" y="0"/>
-          <a:ext cx="0" cy="0"/>
-          <a:chOff x="0" y="0"/>
-          <a:chExt cx="0" cy="0"/>
-        </a:xfrm>
-      </p:grpSpPr>
-      <p:sp>
-        <p:nvSpPr>
-          <p:cNvPr id="4" name="Rectangle 3"/>
-          <p:cNvSpPr/>
-          <p:nvPr/>
-        </p:nvSpPr>
-        <p:spPr>
-          <a:xfrm>
-            <a:off x="304800" y="2514600"/>
-            <a:ext cx="1905000" cy="1143000"/>
-          </a:xfrm>
-          <a:prstGeom prst="rect">
-            <a:avLst/>
-          </a:prstGeom>
-          <a:solidFill>
-            <a:schemeClr val="bg1">
-              <a:lumMod val="75000"/>
-            </a:schemeClr>
-          </a:solidFill>
-          <a:ln>
-            <a:solidFill>
-              <a:schemeClr val="tx1"/>
-            </a:solidFill>
-          </a:ln>
-        </p:spPr>
-        <p:style>
-          <a:lnRef idx="2">
-            <a:schemeClr val="accent1">
-              <a:shade val="50000"/>
-            </a:schemeClr>
-          </a:lnRef>
-          <a:fillRef idx="1">
-            <a:schemeClr val="accent1"/>
-          </a:fillRef>
-          <a:effectRef idx="0">
-            <a:schemeClr val="accent1"/>
-          </a:effectRef>
-          <a:fontRef idx="minor">
-            <a:schemeClr val="lt1"/>
-          </a:fontRef>
-        </p:style>
-        <p:txBody>
-          <a:bodyPr rtlCol="0" anchor="ctr"/>
-          <a:lstStyle/>
-          <a:p>
-            <a:pPr algn="ctr"/>
-            <a:endParaRPr lang="fr-FR"/>
-          </a:p>
-        </p:txBody>
-      </p:sp>
-      <p:sp>
-        <p:nvSpPr>
-          <p:cNvPr id="7" name="Rectangle 6">
-            <a:hlinkClick r:id="" action="ppaction://noaction">
-              <a:snd r:embed="rId2" name="Random_coo_2.5_001.wav"/>
-            </a:hlinkClick>
-          </p:cNvPr>
-          <p:cNvSpPr/>
-          <p:nvPr/>
-        </p:nvSpPr>
-        <p:spPr>
-          <a:xfrm>
-            <a:off x="2514600" y="2514600"/>
-            <a:ext cx="1905000" cy="1143000"/>
-          </a:xfrm>
-          <a:prstGeom prst="rect">
-            <a:avLst/>
-          </a:prstGeom>
-          <a:solidFill>
-            <a:schemeClr val="bg1"/>
-          </a:solidFill>
-          <a:ln>
-            <a:solidFill>
-              <a:schemeClr val="tx1"/>
-            </a:solidFill>
-          </a:ln>
-        </p:spPr>
-        <p:style>
-          <a:lnRef idx="2">
-            <a:schemeClr val="accent1">
-              <a:shade val="50000"/>
-            </a:schemeClr>
-          </a:lnRef>
-          <a:fillRef idx="1">
-            <a:schemeClr val="accent1"/>
-          </a:fillRef>
-          <a:effectRef idx="0">
-            <a:schemeClr val="accent1"/>
-          </a:effectRef>
-          <a:fontRef idx="minor">
-            <a:schemeClr val="lt1"/>
-          </a:fontRef>
-        </p:style>
-        <p:txBody>
-          <a:bodyPr rtlCol="0" anchor="ctr"/>
-          <a:lstStyle/>
-          <a:p>
-            <a:pPr algn="ctr"/>
-            <a:endParaRPr lang="fr-FR"/>
-          </a:p>
-        </p:txBody>
-      </p:sp>
-      <p:sp>
-        <p:nvSpPr>
-          <p:cNvPr id="15" name="TextBox 14"/>
-          <p:cNvSpPr txBox="1"/>
-          <p:nvPr/>
-        </p:nvSpPr>
-        <p:spPr>
-          <a:xfrm>
-            <a:off x="5410200" y="2667000"/>
-            <a:ext cx="1143000" cy="646331"/>
-          </a:xfrm>
-          <a:prstGeom prst="rect">
-            <a:avLst/>
-          </a:prstGeom>
-          <a:noFill/>
-        </p:spPr>
-        <p:txBody>
-          <a:bodyPr wrap="square" rtlCol="0">
-            <a:spAutoFit/>
-          </a:bodyPr>
-          <a:lstStyle/>
-          <a:p>
-            <a:pPr algn="ctr"/>
-            <a:r>
-              <a:rPr lang="en-US" dirty="0" smtClean="0"/>
-              <a:t>touché</a:t>
-            </a:r>
-          </a:p>
-          <a:p>
-            <a:pPr algn="ctr"/>
-            <a:r>
-              <a:rPr lang="en-US" dirty="0" smtClean="0"/>
-              <a:t>&lt;500ms ?</a:t>
-            </a:r>
-            <a:endParaRPr lang="fr-FR" dirty="0"/>
-          </a:p>
-        </p:txBody>
-      </p:sp>
-      <p:grpSp>
-        <p:nvGrpSpPr>
-          <p:cNvPr id="24" name="Group 23"/>
-          <p:cNvGrpSpPr/>
-          <p:nvPr/>
-        </p:nvGrpSpPr>
-        <p:grpSpPr>
-          <a:xfrm>
-            <a:off x="6477000" y="2133600"/>
-            <a:ext cx="2552700" cy="1524000"/>
-            <a:chOff x="6477000" y="2133600"/>
-            <a:chExt cx="2552700" cy="1524000"/>
-          </a:xfrm>
-        </p:grpSpPr>
-        <p:grpSp>
-          <p:nvGrpSpPr>
-            <p:cNvPr id="14" name="Group 13"/>
-            <p:cNvGrpSpPr/>
-            <p:nvPr/>
-          </p:nvGrpSpPr>
-          <p:grpSpPr>
-            <a:xfrm>
-              <a:off x="7124700" y="2133600"/>
-              <a:ext cx="1905000" cy="1524000"/>
-              <a:chOff x="7010400" y="1066800"/>
-              <a:chExt cx="1905000" cy="1524000"/>
-            </a:xfrm>
-          </p:grpSpPr>
-          <p:sp>
-            <p:nvSpPr>
-              <p:cNvPr id="12" name="Rectangle 11"/>
-              <p:cNvSpPr/>
-              <p:nvPr/>
-            </p:nvSpPr>
-            <p:spPr>
-              <a:xfrm>
-                <a:off x="7010400" y="1447800"/>
-                <a:ext cx="1905000" cy="1143000"/>
-              </a:xfrm>
-              <a:prstGeom prst="rect">
-                <a:avLst/>
-              </a:prstGeom>
-              <a:solidFill>
-                <a:schemeClr val="bg1"/>
-              </a:solidFill>
-              <a:ln>
-                <a:solidFill>
-                  <a:schemeClr val="tx1"/>
-                </a:solidFill>
-              </a:ln>
-            </p:spPr>
-            <p:style>
-              <a:lnRef idx="2">
-                <a:schemeClr val="accent1">
-                  <a:shade val="50000"/>
-                </a:schemeClr>
-              </a:lnRef>
-              <a:fillRef idx="1">
-                <a:schemeClr val="accent1"/>
-              </a:fillRef>
-              <a:effectRef idx="0">
-                <a:schemeClr val="accent1"/>
-              </a:effectRef>
-              <a:fontRef idx="minor">
-                <a:schemeClr val="lt1"/>
-              </a:fontRef>
-            </p:style>
-            <p:txBody>
-              <a:bodyPr rtlCol="0" anchor="ctr"/>
-              <a:lstStyle/>
-              <a:p>
-                <a:pPr algn="ctr"/>
-                <a:endParaRPr lang="fr-FR"/>
-              </a:p>
-            </p:txBody>
-          </p:sp>
-          <p:sp>
-            <p:nvSpPr>
-              <p:cNvPr id="13" name="TextBox 12"/>
-              <p:cNvSpPr txBox="1"/>
-              <p:nvPr/>
-            </p:nvSpPr>
-            <p:spPr>
-              <a:xfrm>
-                <a:off x="7734696" y="1066800"/>
-                <a:ext cx="418704" cy="369332"/>
-              </a:xfrm>
-              <a:prstGeom prst="rect">
-                <a:avLst/>
-              </a:prstGeom>
-              <a:noFill/>
-            </p:spPr>
-            <p:txBody>
-              <a:bodyPr wrap="none" rtlCol="0">
-                <a:spAutoFit/>
-              </a:bodyPr>
-              <a:lstStyle/>
-              <a:p>
-                <a:r>
-                  <a:rPr lang="en-US" b="1" dirty="0" smtClean="0"/>
-                  <a:t>$$</a:t>
-                </a:r>
-                <a:endParaRPr lang="fr-FR" b="1" dirty="0"/>
-              </a:p>
-            </p:txBody>
-          </p:sp>
-        </p:grpSp>
-        <p:cxnSp>
-          <p:nvCxnSpPr>
-            <p:cNvPr id="17" name="Straight Arrow Connector 16"/>
-            <p:cNvCxnSpPr/>
-            <p:nvPr/>
-          </p:nvCxnSpPr>
-          <p:spPr>
-            <a:xfrm>
-              <a:off x="6553200" y="2990165"/>
-              <a:ext cx="457200" cy="0"/>
-            </a:xfrm>
-            <a:prstGeom prst="straightConnector1">
-              <a:avLst/>
-            </a:prstGeom>
-            <a:ln>
-              <a:tailEnd type="arrow"/>
-            </a:ln>
-          </p:spPr>
-          <p:style>
-            <a:lnRef idx="1">
-              <a:schemeClr val="accent1"/>
-            </a:lnRef>
-            <a:fillRef idx="0">
-              <a:schemeClr val="accent1"/>
-            </a:fillRef>
-            <a:effectRef idx="0">
-              <a:schemeClr val="accent1"/>
-            </a:effectRef>
-            <a:fontRef idx="minor">
-              <a:schemeClr val="tx1"/>
-            </a:fontRef>
-          </p:style>
-        </p:cxnSp>
-        <p:sp>
-          <p:nvSpPr>
-            <p:cNvPr id="20" name="TextBox 19"/>
-            <p:cNvSpPr txBox="1"/>
-            <p:nvPr/>
-          </p:nvSpPr>
-          <p:spPr>
-            <a:xfrm>
-              <a:off x="6477000" y="2983468"/>
-              <a:ext cx="542136" cy="369332"/>
-            </a:xfrm>
-            <a:prstGeom prst="rect">
-              <a:avLst/>
-            </a:prstGeom>
-            <a:noFill/>
-          </p:spPr>
-          <p:txBody>
-            <a:bodyPr wrap="none" rtlCol="0">
-              <a:spAutoFit/>
-            </a:bodyPr>
-            <a:lstStyle/>
-            <a:p>
-              <a:r>
-                <a:rPr lang="en-US" dirty="0" smtClean="0"/>
-                <a:t>OUI</a:t>
-              </a:r>
-              <a:endParaRPr lang="fr-FR" dirty="0"/>
-            </a:p>
-          </p:txBody>
-        </p:sp>
-      </p:grpSp>
-      <p:grpSp>
-        <p:nvGrpSpPr>
-          <p:cNvPr id="23" name="Group 22"/>
-          <p:cNvGrpSpPr/>
-          <p:nvPr/>
-        </p:nvGrpSpPr>
-        <p:grpSpPr>
-          <a:xfrm>
-            <a:off x="6477000" y="3962400"/>
-            <a:ext cx="2552700" cy="1676400"/>
-            <a:chOff x="6477000" y="3962400"/>
-            <a:chExt cx="2552700" cy="1676400"/>
-          </a:xfrm>
-        </p:grpSpPr>
-        <p:sp>
-          <p:nvSpPr>
-            <p:cNvPr id="11" name="Rectangle 10"/>
-            <p:cNvSpPr/>
-            <p:nvPr/>
-          </p:nvSpPr>
-          <p:spPr>
-            <a:xfrm>
-              <a:off x="7124700" y="4038600"/>
-              <a:ext cx="1905000" cy="1143000"/>
-            </a:xfrm>
-            <a:prstGeom prst="rect">
-              <a:avLst/>
-            </a:prstGeom>
-            <a:solidFill>
-              <a:schemeClr val="tx1"/>
-            </a:solidFill>
-            <a:ln>
-              <a:solidFill>
-                <a:schemeClr val="tx1"/>
-              </a:solidFill>
-            </a:ln>
-          </p:spPr>
-          <p:style>
-            <a:lnRef idx="2">
-              <a:schemeClr val="accent1">
-                <a:shade val="50000"/>
-              </a:schemeClr>
-            </a:lnRef>
-            <a:fillRef idx="1">
-              <a:schemeClr val="accent1"/>
-            </a:fillRef>
-            <a:effectRef idx="0">
-              <a:schemeClr val="accent1"/>
-            </a:effectRef>
-            <a:fontRef idx="minor">
-              <a:schemeClr val="lt1"/>
-            </a:fontRef>
-          </p:style>
-          <p:txBody>
-            <a:bodyPr rtlCol="0" anchor="ctr"/>
-            <a:lstStyle/>
-            <a:p>
-              <a:pPr algn="ctr"/>
-              <a:endParaRPr lang="fr-FR"/>
-            </a:p>
-          </p:txBody>
-        </p:sp>
-        <p:cxnSp>
-          <p:nvCxnSpPr>
-            <p:cNvPr id="19" name="Straight Arrow Connector 18"/>
-            <p:cNvCxnSpPr/>
-            <p:nvPr/>
-          </p:nvCxnSpPr>
-          <p:spPr>
-            <a:xfrm>
-              <a:off x="6553200" y="3962400"/>
-              <a:ext cx="457200" cy="647700"/>
-            </a:xfrm>
-            <a:prstGeom prst="straightConnector1">
-              <a:avLst/>
-            </a:prstGeom>
-            <a:ln>
-              <a:tailEnd type="arrow"/>
-            </a:ln>
-          </p:spPr>
-          <p:style>
-            <a:lnRef idx="1">
-              <a:schemeClr val="accent1"/>
-            </a:lnRef>
-            <a:fillRef idx="0">
-              <a:schemeClr val="accent1"/>
-            </a:fillRef>
-            <a:effectRef idx="0">
-              <a:schemeClr val="accent1"/>
-            </a:effectRef>
-            <a:fontRef idx="minor">
-              <a:schemeClr val="tx1"/>
-            </a:fontRef>
-          </p:style>
-        </p:cxnSp>
-        <p:sp>
-          <p:nvSpPr>
-            <p:cNvPr id="21" name="TextBox 20"/>
-            <p:cNvSpPr txBox="1"/>
-            <p:nvPr/>
-          </p:nvSpPr>
-          <p:spPr>
-            <a:xfrm>
-              <a:off x="6477000" y="4583668"/>
-              <a:ext cx="635110" cy="369332"/>
-            </a:xfrm>
-            <a:prstGeom prst="rect">
-              <a:avLst/>
-            </a:prstGeom>
-            <a:noFill/>
-          </p:spPr>
-          <p:txBody>
-            <a:bodyPr wrap="none" rtlCol="0">
-              <a:spAutoFit/>
-            </a:bodyPr>
-            <a:lstStyle/>
-            <a:p>
-              <a:r>
-                <a:rPr lang="en-US" dirty="0" smtClean="0"/>
-                <a:t>NON</a:t>
-              </a:r>
-              <a:endParaRPr lang="fr-FR" dirty="0"/>
-            </a:p>
-          </p:txBody>
-        </p:sp>
-        <p:sp>
-          <p:nvSpPr>
-            <p:cNvPr id="22" name="TextBox 21"/>
-            <p:cNvSpPr txBox="1"/>
-            <p:nvPr/>
-          </p:nvSpPr>
-          <p:spPr>
-            <a:xfrm>
-              <a:off x="7456976" y="5269468"/>
-              <a:ext cx="1229824" cy="369332"/>
-            </a:xfrm>
-            <a:prstGeom prst="rect">
-              <a:avLst/>
-            </a:prstGeom>
-            <a:noFill/>
-          </p:spPr>
-          <p:txBody>
-            <a:bodyPr wrap="none" rtlCol="0">
-              <a:spAutoFit/>
-            </a:bodyPr>
-            <a:lstStyle/>
-            <a:p>
-              <a:r>
-                <a:rPr lang="en-US" dirty="0" smtClean="0"/>
-                <a:t>Timeout 3s</a:t>
-              </a:r>
-              <a:endParaRPr lang="fr-FR" dirty="0"/>
-            </a:p>
-          </p:txBody>
-        </p:sp>
-      </p:grpSp>
-      <p:pic>
-        <p:nvPicPr>
-          <p:cNvPr id="2050" name="Picture 2"/>
-          <p:cNvPicPr>
-            <a:picLocks noChangeAspect="1" noChangeArrowheads="1"/>
-          </p:cNvPicPr>
-          <p:nvPr/>
-        </p:nvPicPr>
-        <p:blipFill>
-          <a:blip r:embed="rId3">
-            <a:extLst>
-              <a:ext uri="{28A0092B-C50C-407E-A947-70E740481C1C}">
-                <a14:useLocalDpi xmlns:a14="http://schemas.microsoft.com/office/drawing/2010/main" val="0"/>
-              </a:ext>
-            </a:extLst>
-          </a:blip>
-          <a:srcRect/>
-          <a:stretch>
-            <a:fillRect/>
-          </a:stretch>
-        </p:blipFill>
-        <p:spPr bwMode="auto">
-          <a:xfrm>
-            <a:off x="3124200" y="3801546"/>
-            <a:ext cx="900113" cy="1652588"/>
-          </a:xfrm>
-          <a:prstGeom prst="rect">
-            <a:avLst/>
-          </a:prstGeom>
-          <a:noFill/>
-          <a:ln>
-            <a:noFill/>
-          </a:ln>
-          <a:effectLst/>
-          <a:extLst>
-            <a:ext uri="{909E8E84-426E-40DD-AFC4-6F175D3DCCD1}">
-              <a14:hiddenFill xmlns:a14="http://schemas.microsoft.com/office/drawing/2010/main">
-                <a:solidFill>
-                  <a:schemeClr val="accent1"/>
-                </a:solidFill>
-              </a14:hiddenFill>
-            </a:ext>
-            <a:ext uri="{91240B29-F687-4F45-9708-019B960494DF}">
-              <a14:hiddenLine xmlns:a14="http://schemas.microsoft.com/office/drawing/2010/main" w="9525">
-                <a:solidFill>
-                  <a:schemeClr val="tx1"/>
-                </a:solidFill>
-                <a:miter lim="800000"/>
-                <a:headEnd/>
-                <a:tailEnd/>
-              </a14:hiddenLine>
-            </a:ext>
-            <a:ext uri="{AF507438-7753-43E0-B8FC-AC1667EBCBE1}">
-              <a14:hiddenEffects xmlns:a14="http://schemas.microsoft.com/office/drawing/2010/main">
-                <a:effectLst>
-                  <a:outerShdw dist="35921" dir="2700000" algn="ctr" rotWithShape="0">
-                    <a:schemeClr val="bg2"/>
-                  </a:outerShdw>
-                </a:effectLst>
-              </a14:hiddenEffects>
-            </a:ext>
-          </a:extLst>
-        </p:spPr>
-      </p:pic>
-      <p:sp>
-        <p:nvSpPr>
-          <p:cNvPr id="18" name="TextBox 17"/>
-          <p:cNvSpPr txBox="1"/>
-          <p:nvPr/>
-        </p:nvSpPr>
-        <p:spPr>
-          <a:xfrm>
-            <a:off x="3633136" y="0"/>
-            <a:ext cx="1853264" cy="830997"/>
-          </a:xfrm>
-          <a:prstGeom prst="rect">
-            <a:avLst/>
-          </a:prstGeom>
-          <a:noFill/>
-        </p:spPr>
-        <p:txBody>
-          <a:bodyPr wrap="none" rtlCol="0">
-            <a:spAutoFit/>
-          </a:bodyPr>
-          <a:lstStyle/>
-          <a:p>
-            <a:pPr algn="ctr"/>
-            <a:r>
-              <a:rPr lang="en-US" sz="2400" b="1" dirty="0" smtClean="0"/>
-              <a:t>OMM TASK 1</a:t>
-            </a:r>
-          </a:p>
-          <a:p>
-            <a:pPr algn="ctr"/>
-            <a:r>
-              <a:rPr lang="en-US" sz="2400" b="1" dirty="0" smtClean="0"/>
-              <a:t>Phase 1</a:t>
-            </a:r>
-            <a:endParaRPr lang="fr-FR" sz="2400" b="1" dirty="0" smtClean="0"/>
-          </a:p>
-        </p:txBody>
-      </p:sp>
-    </p:spTree>
-    <p:extLst>
-      <p:ext uri="{BB962C8B-B14F-4D97-AF65-F5344CB8AC3E}">
-        <p14:creationId xmlns:p14="http://schemas.microsoft.com/office/powerpoint/2010/main" val="2339972639"/>
-      </p:ext>
-    </p:extLst>
-  </p:cSld>
-  <p:clrMapOvr>
-    <a:masterClrMapping/>
-  </p:clrMapOvr>
-  <p:timing>
-    <p:tnLst>
-      <p:par>
-        <p:cTn id="1" dur="indefinite" restart="never" nodeType="tmRoot">
-          <p:childTnLst>
-            <p:seq concurrent="1" nextAc="seek">
-              <p:cTn id="2" dur="indefinite" nodeType="mainSeq">
-                <p:childTnLst>
-                  <p:par>
-                    <p:cTn id="3" fill="hold">
-                      <p:stCondLst>
-                        <p:cond delay="indefinite"/>
-                      </p:stCondLst>
-                      <p:childTnLst>
-                        <p:par>
-                          <p:cTn id="4" fill="hold">
-                            <p:stCondLst>
-                              <p:cond delay="0"/>
-                            </p:stCondLst>
-                            <p:childTnLst>
-                              <p:par>
-                                <p:cTn id="5" presetID="14" presetClass="entr" presetSubtype="10" fill="hold" grpId="0" nodeType="clickEffect">
-                                  <p:stCondLst>
-                                    <p:cond delay="0"/>
-                                  </p:stCondLst>
-                                  <p:childTnLst>
-                                    <p:set>
-                                      <p:cBhvr>
-                                        <p:cTn id="6" dur="1" fill="hold">
-                                          <p:stCondLst>
-                                            <p:cond delay="0"/>
-                                          </p:stCondLst>
-                                        </p:cTn>
-                                        <p:tgtEl>
-                                          <p:spTgt spid="7"/>
-                                        </p:tgtEl>
-                                        <p:attrNameLst>
-                                          <p:attrName>style.visibility</p:attrName>
-                                        </p:attrNameLst>
-                                      </p:cBhvr>
-                                      <p:to>
-                                        <p:strVal val="visible"/>
-                                      </p:to>
-                                    </p:set>
-                                    <p:animEffect transition="in" filter="randombar(horizontal)">
-                                      <p:cBhvr>
-                                        <p:cTn id="7" dur="500"/>
-                                        <p:tgtEl>
-                                          <p:spTgt spid="7"/>
-                                        </p:tgtEl>
-                                      </p:cBhvr>
-                                    </p:animEffect>
-                                  </p:childTnLst>
-                                </p:cTn>
-                              </p:par>
-                            </p:childTnLst>
-                          </p:cTn>
-                        </p:par>
-                      </p:childTnLst>
-                    </p:cTn>
-                  </p:par>
-                  <p:par>
-                    <p:cTn id="8" fill="hold">
-                      <p:stCondLst>
-                        <p:cond delay="indefinite"/>
-                      </p:stCondLst>
-                      <p:childTnLst>
-                        <p:par>
-                          <p:cTn id="9" fill="hold">
-                            <p:stCondLst>
-                              <p:cond delay="0"/>
-                            </p:stCondLst>
-                            <p:childTnLst>
-                              <p:par>
-                                <p:cTn id="10" presetID="14" presetClass="entr" presetSubtype="10" fill="hold" grpId="0" nodeType="clickEffect">
-                                  <p:stCondLst>
-                                    <p:cond delay="0"/>
-                                  </p:stCondLst>
-                                  <p:childTnLst>
-                                    <p:set>
-                                      <p:cBhvr>
-                                        <p:cTn id="11" dur="1" fill="hold">
-                                          <p:stCondLst>
-                                            <p:cond delay="0"/>
-                                          </p:stCondLst>
-                                        </p:cTn>
-                                        <p:tgtEl>
-                                          <p:spTgt spid="15"/>
-                                        </p:tgtEl>
-                                        <p:attrNameLst>
-                                          <p:attrName>style.visibility</p:attrName>
-                                        </p:attrNameLst>
-                                      </p:cBhvr>
-                                      <p:to>
-                                        <p:strVal val="visible"/>
-                                      </p:to>
-                                    </p:set>
-                                    <p:animEffect transition="in" filter="randombar(horizontal)">
-                                      <p:cBhvr>
-                                        <p:cTn id="12" dur="500"/>
-                                        <p:tgtEl>
-                                          <p:spTgt spid="15"/>
-                                        </p:tgtEl>
-                                      </p:cBhvr>
-                                    </p:animEffect>
-                                  </p:childTnLst>
-                                </p:cTn>
-                              </p:par>
-                            </p:childTnLst>
-                          </p:cTn>
-                        </p:par>
-                      </p:childTnLst>
-                    </p:cTn>
-                  </p:par>
-                  <p:par>
-                    <p:cTn id="13" fill="hold">
-                      <p:stCondLst>
-                        <p:cond delay="indefinite"/>
-                      </p:stCondLst>
-                      <p:childTnLst>
-                        <p:par>
-                          <p:cTn id="14" fill="hold">
-                            <p:stCondLst>
-                              <p:cond delay="0"/>
-                            </p:stCondLst>
-                            <p:childTnLst>
-                              <p:par>
-                                <p:cTn id="15" presetID="14" presetClass="entr" presetSubtype="10" fill="hold" nodeType="clickEffect">
-                                  <p:stCondLst>
-                                    <p:cond delay="0"/>
-                                  </p:stCondLst>
-                                  <p:childTnLst>
-                                    <p:set>
-                                      <p:cBhvr>
-                                        <p:cTn id="16" dur="1" fill="hold">
-                                          <p:stCondLst>
-                                            <p:cond delay="0"/>
-                                          </p:stCondLst>
-                                        </p:cTn>
-                                        <p:tgtEl>
-                                          <p:spTgt spid="24"/>
-                                        </p:tgtEl>
-                                        <p:attrNameLst>
-                                          <p:attrName>style.visibility</p:attrName>
-                                        </p:attrNameLst>
-                                      </p:cBhvr>
-                                      <p:to>
-                                        <p:strVal val="visible"/>
-                                      </p:to>
-                                    </p:set>
-                                    <p:animEffect transition="in" filter="randombar(horizontal)">
-                                      <p:cBhvr>
-                                        <p:cTn id="17" dur="500"/>
-                                        <p:tgtEl>
-                                          <p:spTgt spid="24"/>
-                                        </p:tgtEl>
-                                      </p:cBhvr>
-                                    </p:animEffect>
-                                  </p:childTnLst>
-                                </p:cTn>
-                              </p:par>
-                            </p:childTnLst>
-                          </p:cTn>
-                        </p:par>
-                      </p:childTnLst>
-                    </p:cTn>
-                  </p:par>
-                  <p:par>
-                    <p:cTn id="18" fill="hold">
-                      <p:stCondLst>
-                        <p:cond delay="indefinite"/>
-                      </p:stCondLst>
-                      <p:childTnLst>
-                        <p:par>
-                          <p:cTn id="19" fill="hold">
-                            <p:stCondLst>
-                              <p:cond delay="0"/>
-                            </p:stCondLst>
-                            <p:childTnLst>
-                              <p:par>
-                                <p:cTn id="20" presetID="14" presetClass="entr" presetSubtype="10" fill="hold" nodeType="clickEffect">
-                                  <p:stCondLst>
-                                    <p:cond delay="0"/>
-                                  </p:stCondLst>
-                                  <p:childTnLst>
-                                    <p:set>
-                                      <p:cBhvr>
-                                        <p:cTn id="21" dur="1" fill="hold">
-                                          <p:stCondLst>
-                                            <p:cond delay="0"/>
-                                          </p:stCondLst>
-                                        </p:cTn>
-                                        <p:tgtEl>
-                                          <p:spTgt spid="23"/>
-                                        </p:tgtEl>
-                                        <p:attrNameLst>
-                                          <p:attrName>style.visibility</p:attrName>
-                                        </p:attrNameLst>
-                                      </p:cBhvr>
-                                      <p:to>
-                                        <p:strVal val="visible"/>
-                                      </p:to>
-                                    </p:set>
-                                    <p:animEffect transition="in" filter="randombar(horizontal)">
-                                      <p:cBhvr>
-                                        <p:cTn id="22" dur="500"/>
-                                        <p:tgtEl>
-                                          <p:spTgt spid="23"/>
-                                        </p:tgtEl>
-                                      </p:cBhvr>
-                                    </p:animEffect>
-                                  </p:childTnLst>
-                                </p:cTn>
-                              </p:par>
-                            </p:childTnLst>
-                          </p:cTn>
-                        </p:par>
-                      </p:childTnLst>
-                    </p:cTn>
-                  </p:par>
-                </p:childTnLst>
-              </p:cTn>
-              <p:prevCondLst>
-                <p:cond evt="onPrev" delay="0">
-                  <p:tgtEl>
-                    <p:sldTgt/>
-                  </p:tgtEl>
-                </p:cond>
-              </p:prevCondLst>
-              <p:nextCondLst>
-                <p:cond evt="onNext" delay="0">
-                  <p:tgtEl>
-                    <p:sldTgt/>
-                  </p:tgtEl>
-                </p:cond>
-              </p:nextCondLst>
-            </p:seq>
-          </p:childTnLst>
-        </p:cTn>
-      </p:par>
-    </p:tnLst>
-    <p:bldLst>
-      <p:bldP spid="7" grpId="0" animBg="1"/>
-      <p:bldP spid="15" grpId="0"/>
-    </p:bldLst>
-  </p:timing>
-</p:sld>
-</file>
-
-<file path=ppt/slides/slide5.xml><?xml version="1.0" encoding="utf-8"?>
-<p:sld xmlns:a="http://schemas.openxmlformats.org/drawingml/2006/main" xmlns:r="http://schemas.openxmlformats.org/officeDocument/2006/relationships" xmlns:p="http://schemas.openxmlformats.org/presentationml/2006/main">
-  <p:cSld>
-    <p:spTree>
-      <p:nvGrpSpPr>
-        <p:cNvPr id="1" name=""/>
-        <p:cNvGrpSpPr/>
-        <p:nvPr/>
-      </p:nvGrpSpPr>
-      <p:grpSpPr>
-        <a:xfrm>
-          <a:off x="0" y="0"/>
-          <a:ext cx="0" cy="0"/>
-          <a:chOff x="0" y="0"/>
-          <a:chExt cx="0" cy="0"/>
-        </a:xfrm>
-      </p:grpSpPr>
-      <p:pic>
-        <p:nvPicPr>
-          <p:cNvPr id="3074" name="Picture 2"/>
-          <p:cNvPicPr>
-            <a:picLocks noChangeAspect="1" noChangeArrowheads="1"/>
-          </p:cNvPicPr>
-          <p:nvPr/>
-        </p:nvPicPr>
-        <p:blipFill>
-          <a:blip r:embed="rId2" cstate="print">
-            <a:extLst>
-              <a:ext uri="{28A0092B-C50C-407E-A947-70E740481C1C}">
-                <a14:useLocalDpi xmlns:a14="http://schemas.microsoft.com/office/drawing/2010/main" val="0"/>
-              </a:ext>
-            </a:extLst>
-          </a:blip>
-          <a:srcRect/>
-          <a:stretch>
-            <a:fillRect/>
-          </a:stretch>
-        </p:blipFill>
-        <p:spPr bwMode="auto">
-          <a:xfrm>
-            <a:off x="2514600" y="3886200"/>
-            <a:ext cx="1439480" cy="1447219"/>
-          </a:xfrm>
-          <a:prstGeom prst="rect">
-            <a:avLst/>
-          </a:prstGeom>
-          <a:noFill/>
-          <a:ln>
-            <a:noFill/>
-          </a:ln>
-          <a:effectLst/>
-          <a:extLst>
-            <a:ext uri="{909E8E84-426E-40DD-AFC4-6F175D3DCCD1}">
-              <a14:hiddenFill xmlns:a14="http://schemas.microsoft.com/office/drawing/2010/main">
-                <a:solidFill>
-                  <a:schemeClr val="accent1"/>
-                </a:solidFill>
-              </a14:hiddenFill>
-            </a:ext>
-            <a:ext uri="{91240B29-F687-4F45-9708-019B960494DF}">
-              <a14:hiddenLine xmlns:a14="http://schemas.microsoft.com/office/drawing/2010/main" w="9525">
-                <a:solidFill>
-                  <a:schemeClr val="tx1"/>
-                </a:solidFill>
-                <a:miter lim="800000"/>
-                <a:headEnd/>
-                <a:tailEnd/>
-              </a14:hiddenLine>
-            </a:ext>
-            <a:ext uri="{AF507438-7753-43E0-B8FC-AC1667EBCBE1}">
-              <a14:hiddenEffects xmlns:a14="http://schemas.microsoft.com/office/drawing/2010/main">
-                <a:effectLst>
-                  <a:outerShdw dist="35921" dir="2700000" algn="ctr" rotWithShape="0">
-                    <a:schemeClr val="bg2"/>
-                  </a:outerShdw>
-                </a:effectLst>
-              </a14:hiddenEffects>
-            </a:ext>
-          </a:extLst>
-        </p:spPr>
-      </p:pic>
-      <p:sp>
-        <p:nvSpPr>
-          <p:cNvPr id="4" name="Rectangle 3"/>
-          <p:cNvSpPr/>
-          <p:nvPr/>
-        </p:nvSpPr>
-        <p:spPr>
-          <a:xfrm>
-            <a:off x="304800" y="2514600"/>
-            <a:ext cx="1905000" cy="1143000"/>
-          </a:xfrm>
-          <a:prstGeom prst="rect">
-            <a:avLst/>
-          </a:prstGeom>
-          <a:solidFill>
-            <a:schemeClr val="bg1">
-              <a:lumMod val="75000"/>
-            </a:schemeClr>
-          </a:solidFill>
-          <a:ln>
-            <a:solidFill>
-              <a:schemeClr val="tx1"/>
-            </a:solidFill>
-          </a:ln>
-        </p:spPr>
-        <p:style>
-          <a:lnRef idx="2">
-            <a:schemeClr val="accent1">
-              <a:shade val="50000"/>
-            </a:schemeClr>
-          </a:lnRef>
-          <a:fillRef idx="1">
-            <a:schemeClr val="accent1"/>
-          </a:fillRef>
-          <a:effectRef idx="0">
-            <a:schemeClr val="accent1"/>
-          </a:effectRef>
-          <a:fontRef idx="minor">
-            <a:schemeClr val="lt1"/>
-          </a:fontRef>
-        </p:style>
-        <p:txBody>
-          <a:bodyPr rtlCol="0" anchor="ctr"/>
-          <a:lstStyle/>
-          <a:p>
-            <a:pPr algn="ctr"/>
-            <a:endParaRPr lang="fr-FR"/>
-          </a:p>
-        </p:txBody>
-      </p:sp>
-      <p:sp>
-        <p:nvSpPr>
-          <p:cNvPr id="7" name="Rectangle 6">
-            <a:hlinkClick r:id="" action="ppaction://noaction">
-              <a:snd r:embed="rId3" name="Random_coo_2.5_001.wav"/>
-            </a:hlinkClick>
-          </p:cNvPr>
-          <p:cNvSpPr/>
-          <p:nvPr/>
-        </p:nvSpPr>
-        <p:spPr>
-          <a:xfrm>
-            <a:off x="2514600" y="2514600"/>
-            <a:ext cx="1905000" cy="1143000"/>
-          </a:xfrm>
-          <a:prstGeom prst="rect">
-            <a:avLst/>
-          </a:prstGeom>
-          <a:solidFill>
-            <a:schemeClr val="bg1"/>
-          </a:solidFill>
-          <a:ln>
-            <a:solidFill>
-              <a:schemeClr val="tx1"/>
-            </a:solidFill>
-          </a:ln>
-        </p:spPr>
-        <p:style>
-          <a:lnRef idx="2">
-            <a:schemeClr val="accent1">
-              <a:shade val="50000"/>
-            </a:schemeClr>
-          </a:lnRef>
-          <a:fillRef idx="1">
-            <a:schemeClr val="accent1"/>
-          </a:fillRef>
-          <a:effectRef idx="0">
-            <a:schemeClr val="accent1"/>
-          </a:effectRef>
-          <a:fontRef idx="minor">
-            <a:schemeClr val="lt1"/>
-          </a:fontRef>
-        </p:style>
-        <p:txBody>
-          <a:bodyPr rtlCol="0" anchor="ctr"/>
-          <a:lstStyle/>
-          <a:p>
-            <a:pPr algn="ctr"/>
-            <a:endParaRPr lang="fr-FR"/>
-          </a:p>
-        </p:txBody>
-      </p:sp>
-      <p:sp>
-        <p:nvSpPr>
-          <p:cNvPr id="15" name="TextBox 14"/>
-          <p:cNvSpPr txBox="1"/>
-          <p:nvPr/>
-        </p:nvSpPr>
-        <p:spPr>
-          <a:xfrm>
-            <a:off x="5410200" y="2667000"/>
-            <a:ext cx="1143000" cy="646331"/>
-          </a:xfrm>
-          <a:prstGeom prst="rect">
-            <a:avLst/>
-          </a:prstGeom>
-          <a:noFill/>
-        </p:spPr>
-        <p:txBody>
-          <a:bodyPr wrap="square" rtlCol="0">
-            <a:spAutoFit/>
-          </a:bodyPr>
-          <a:lstStyle/>
-          <a:p>
-            <a:pPr algn="ctr"/>
-            <a:r>
-              <a:rPr lang="en-US" dirty="0" smtClean="0"/>
-              <a:t>touché</a:t>
-            </a:r>
-          </a:p>
-          <a:p>
-            <a:pPr algn="ctr"/>
-            <a:r>
-              <a:rPr lang="en-US" dirty="0" smtClean="0"/>
-              <a:t>&lt;500ms ?</a:t>
-            </a:r>
-            <a:endParaRPr lang="fr-FR" dirty="0"/>
-          </a:p>
-        </p:txBody>
-      </p:sp>
-      <p:grpSp>
-        <p:nvGrpSpPr>
-          <p:cNvPr id="24" name="Group 23"/>
-          <p:cNvGrpSpPr/>
-          <p:nvPr/>
-        </p:nvGrpSpPr>
-        <p:grpSpPr>
-          <a:xfrm>
-            <a:off x="6477000" y="2133600"/>
-            <a:ext cx="2552700" cy="1524000"/>
-            <a:chOff x="6477000" y="2133600"/>
-            <a:chExt cx="2552700" cy="1524000"/>
-          </a:xfrm>
-        </p:grpSpPr>
-        <p:grpSp>
-          <p:nvGrpSpPr>
-            <p:cNvPr id="14" name="Group 13"/>
-            <p:cNvGrpSpPr/>
-            <p:nvPr/>
-          </p:nvGrpSpPr>
-          <p:grpSpPr>
-            <a:xfrm>
-              <a:off x="7124700" y="2133600"/>
-              <a:ext cx="1905000" cy="1524000"/>
-              <a:chOff x="7010400" y="1066800"/>
-              <a:chExt cx="1905000" cy="1524000"/>
-            </a:xfrm>
-          </p:grpSpPr>
-          <p:sp>
-            <p:nvSpPr>
-              <p:cNvPr id="12" name="Rectangle 11"/>
-              <p:cNvSpPr/>
-              <p:nvPr/>
-            </p:nvSpPr>
-            <p:spPr>
-              <a:xfrm>
-                <a:off x="7010400" y="1447800"/>
-                <a:ext cx="1905000" cy="1143000"/>
-              </a:xfrm>
-              <a:prstGeom prst="rect">
-                <a:avLst/>
-              </a:prstGeom>
-              <a:solidFill>
-                <a:schemeClr val="bg1"/>
-              </a:solidFill>
-              <a:ln>
-                <a:solidFill>
-                  <a:schemeClr val="tx1"/>
-                </a:solidFill>
-              </a:ln>
-            </p:spPr>
-            <p:style>
-              <a:lnRef idx="2">
-                <a:schemeClr val="accent1">
-                  <a:shade val="50000"/>
-                </a:schemeClr>
-              </a:lnRef>
-              <a:fillRef idx="1">
-                <a:schemeClr val="accent1"/>
-              </a:fillRef>
-              <a:effectRef idx="0">
-                <a:schemeClr val="accent1"/>
-              </a:effectRef>
-              <a:fontRef idx="minor">
-                <a:schemeClr val="lt1"/>
-              </a:fontRef>
-            </p:style>
-            <p:txBody>
-              <a:bodyPr rtlCol="0" anchor="ctr"/>
-              <a:lstStyle/>
-              <a:p>
-                <a:pPr algn="ctr"/>
-                <a:endParaRPr lang="fr-FR"/>
-              </a:p>
-            </p:txBody>
-          </p:sp>
-          <p:sp>
-            <p:nvSpPr>
-              <p:cNvPr id="13" name="TextBox 12"/>
-              <p:cNvSpPr txBox="1"/>
-              <p:nvPr/>
-            </p:nvSpPr>
-            <p:spPr>
-              <a:xfrm>
-                <a:off x="7734696" y="1066800"/>
-                <a:ext cx="418704" cy="369332"/>
-              </a:xfrm>
-              <a:prstGeom prst="rect">
-                <a:avLst/>
-              </a:prstGeom>
-              <a:noFill/>
-            </p:spPr>
-            <p:txBody>
-              <a:bodyPr wrap="none" rtlCol="0">
-                <a:spAutoFit/>
-              </a:bodyPr>
-              <a:lstStyle/>
-              <a:p>
-                <a:r>
-                  <a:rPr lang="en-US" b="1" dirty="0" smtClean="0"/>
-                  <a:t>$$</a:t>
-                </a:r>
-                <a:endParaRPr lang="fr-FR" b="1" dirty="0"/>
-              </a:p>
-            </p:txBody>
-          </p:sp>
-        </p:grpSp>
-        <p:cxnSp>
-          <p:nvCxnSpPr>
-            <p:cNvPr id="17" name="Straight Arrow Connector 16"/>
-            <p:cNvCxnSpPr/>
-            <p:nvPr/>
-          </p:nvCxnSpPr>
-          <p:spPr>
-            <a:xfrm>
-              <a:off x="6553200" y="2990165"/>
-              <a:ext cx="457200" cy="0"/>
-            </a:xfrm>
-            <a:prstGeom prst="straightConnector1">
-              <a:avLst/>
-            </a:prstGeom>
-            <a:ln>
-              <a:tailEnd type="arrow"/>
-            </a:ln>
-          </p:spPr>
-          <p:style>
-            <a:lnRef idx="1">
-              <a:schemeClr val="accent1"/>
-            </a:lnRef>
-            <a:fillRef idx="0">
-              <a:schemeClr val="accent1"/>
-            </a:fillRef>
-            <a:effectRef idx="0">
-              <a:schemeClr val="accent1"/>
-            </a:effectRef>
-            <a:fontRef idx="minor">
-              <a:schemeClr val="tx1"/>
-            </a:fontRef>
-          </p:style>
-        </p:cxnSp>
-        <p:sp>
-          <p:nvSpPr>
-            <p:cNvPr id="20" name="TextBox 19"/>
-            <p:cNvSpPr txBox="1"/>
-            <p:nvPr/>
-          </p:nvSpPr>
-          <p:spPr>
-            <a:xfrm>
-              <a:off x="6477000" y="2983468"/>
-              <a:ext cx="542136" cy="369332"/>
-            </a:xfrm>
-            <a:prstGeom prst="rect">
-              <a:avLst/>
-            </a:prstGeom>
-            <a:noFill/>
-          </p:spPr>
-          <p:txBody>
-            <a:bodyPr wrap="none" rtlCol="0">
-              <a:spAutoFit/>
-            </a:bodyPr>
-            <a:lstStyle/>
-            <a:p>
-              <a:r>
-                <a:rPr lang="en-US" dirty="0" smtClean="0"/>
-                <a:t>OUI</a:t>
-              </a:r>
-              <a:endParaRPr lang="fr-FR" dirty="0"/>
-            </a:p>
-          </p:txBody>
-        </p:sp>
-      </p:grpSp>
-      <p:grpSp>
-        <p:nvGrpSpPr>
-          <p:cNvPr id="23" name="Group 22"/>
-          <p:cNvGrpSpPr/>
-          <p:nvPr/>
-        </p:nvGrpSpPr>
-        <p:grpSpPr>
-          <a:xfrm>
-            <a:off x="6477000" y="3962400"/>
-            <a:ext cx="2552700" cy="1676400"/>
-            <a:chOff x="6477000" y="3962400"/>
-            <a:chExt cx="2552700" cy="1676400"/>
-          </a:xfrm>
-        </p:grpSpPr>
-        <p:sp>
-          <p:nvSpPr>
-            <p:cNvPr id="11" name="Rectangle 10"/>
-            <p:cNvSpPr/>
-            <p:nvPr/>
-          </p:nvSpPr>
-          <p:spPr>
-            <a:xfrm>
-              <a:off x="7124700" y="4038600"/>
-              <a:ext cx="1905000" cy="1143000"/>
-            </a:xfrm>
-            <a:prstGeom prst="rect">
-              <a:avLst/>
-            </a:prstGeom>
-            <a:solidFill>
-              <a:schemeClr val="tx1"/>
-            </a:solidFill>
-            <a:ln>
-              <a:solidFill>
-                <a:schemeClr val="tx1"/>
-              </a:solidFill>
-            </a:ln>
-          </p:spPr>
-          <p:style>
-            <a:lnRef idx="2">
-              <a:schemeClr val="accent1">
-                <a:shade val="50000"/>
-              </a:schemeClr>
-            </a:lnRef>
-            <a:fillRef idx="1">
-              <a:schemeClr val="accent1"/>
-            </a:fillRef>
-            <a:effectRef idx="0">
-              <a:schemeClr val="accent1"/>
-            </a:effectRef>
-            <a:fontRef idx="minor">
-              <a:schemeClr val="lt1"/>
-            </a:fontRef>
-          </p:style>
-          <p:txBody>
-            <a:bodyPr rtlCol="0" anchor="ctr"/>
-            <a:lstStyle/>
-            <a:p>
-              <a:pPr algn="ctr"/>
-              <a:endParaRPr lang="fr-FR"/>
-            </a:p>
-          </p:txBody>
-        </p:sp>
-        <p:cxnSp>
-          <p:nvCxnSpPr>
-            <p:cNvPr id="19" name="Straight Arrow Connector 18"/>
-            <p:cNvCxnSpPr/>
-            <p:nvPr/>
-          </p:nvCxnSpPr>
-          <p:spPr>
-            <a:xfrm>
-              <a:off x="6553200" y="3962400"/>
-              <a:ext cx="457200" cy="647700"/>
-            </a:xfrm>
-            <a:prstGeom prst="straightConnector1">
-              <a:avLst/>
-            </a:prstGeom>
-            <a:ln>
-              <a:tailEnd type="arrow"/>
-            </a:ln>
-          </p:spPr>
-          <p:style>
-            <a:lnRef idx="1">
-              <a:schemeClr val="accent1"/>
-            </a:lnRef>
-            <a:fillRef idx="0">
-              <a:schemeClr val="accent1"/>
-            </a:fillRef>
-            <a:effectRef idx="0">
-              <a:schemeClr val="accent1"/>
-            </a:effectRef>
-            <a:fontRef idx="minor">
-              <a:schemeClr val="tx1"/>
-            </a:fontRef>
-          </p:style>
-        </p:cxnSp>
-        <p:sp>
-          <p:nvSpPr>
-            <p:cNvPr id="21" name="TextBox 20"/>
-            <p:cNvSpPr txBox="1"/>
-            <p:nvPr/>
-          </p:nvSpPr>
-          <p:spPr>
-            <a:xfrm>
-              <a:off x="6477000" y="4583668"/>
-              <a:ext cx="635110" cy="369332"/>
-            </a:xfrm>
-            <a:prstGeom prst="rect">
-              <a:avLst/>
-            </a:prstGeom>
-            <a:noFill/>
-          </p:spPr>
-          <p:txBody>
-            <a:bodyPr wrap="none" rtlCol="0">
-              <a:spAutoFit/>
-            </a:bodyPr>
-            <a:lstStyle/>
-            <a:p>
-              <a:r>
-                <a:rPr lang="en-US" dirty="0" smtClean="0"/>
-                <a:t>NON</a:t>
-              </a:r>
-              <a:endParaRPr lang="fr-FR" dirty="0"/>
-            </a:p>
-          </p:txBody>
-        </p:sp>
-        <p:sp>
-          <p:nvSpPr>
-            <p:cNvPr id="22" name="TextBox 21"/>
-            <p:cNvSpPr txBox="1"/>
-            <p:nvPr/>
-          </p:nvSpPr>
-          <p:spPr>
-            <a:xfrm>
-              <a:off x="7456976" y="5269468"/>
-              <a:ext cx="1229824" cy="369332"/>
-            </a:xfrm>
-            <a:prstGeom prst="rect">
-              <a:avLst/>
-            </a:prstGeom>
-            <a:noFill/>
-          </p:spPr>
-          <p:txBody>
-            <a:bodyPr wrap="none" rtlCol="0">
-              <a:spAutoFit/>
-            </a:bodyPr>
-            <a:lstStyle/>
-            <a:p>
-              <a:r>
-                <a:rPr lang="en-US" dirty="0" smtClean="0"/>
-                <a:t>Timeout 3s</a:t>
-              </a:r>
-              <a:endParaRPr lang="fr-FR" dirty="0"/>
-            </a:p>
-          </p:txBody>
-        </p:sp>
-      </p:grpSp>
-      <p:sp>
-        <p:nvSpPr>
-          <p:cNvPr id="25" name="TextBox 24"/>
-          <p:cNvSpPr txBox="1"/>
-          <p:nvPr/>
-        </p:nvSpPr>
-        <p:spPr>
-          <a:xfrm>
-            <a:off x="3633136" y="0"/>
-            <a:ext cx="1853264" cy="830997"/>
-          </a:xfrm>
-          <a:prstGeom prst="rect">
-            <a:avLst/>
-          </a:prstGeom>
-          <a:noFill/>
-        </p:spPr>
-        <p:txBody>
-          <a:bodyPr wrap="none" rtlCol="0">
-            <a:spAutoFit/>
-          </a:bodyPr>
-          <a:lstStyle/>
-          <a:p>
-            <a:pPr algn="ctr"/>
-            <a:r>
-              <a:rPr lang="en-US" sz="2400" b="1" dirty="0" smtClean="0"/>
-              <a:t>OMM TASK 1</a:t>
-            </a:r>
-          </a:p>
-          <a:p>
-            <a:pPr algn="ctr"/>
-            <a:r>
-              <a:rPr lang="en-US" sz="2400" b="1" dirty="0" smtClean="0"/>
-              <a:t>Phase 2</a:t>
-            </a:r>
-            <a:endParaRPr lang="fr-FR" sz="2400" b="1" dirty="0" smtClean="0"/>
-          </a:p>
-        </p:txBody>
-      </p:sp>
-      <p:sp>
-        <p:nvSpPr>
-          <p:cNvPr id="2" name="Rectangle 1"/>
-          <p:cNvSpPr/>
-          <p:nvPr/>
-        </p:nvSpPr>
-        <p:spPr>
-          <a:xfrm>
-            <a:off x="3234340" y="3886200"/>
-            <a:ext cx="685801" cy="1447219"/>
-          </a:xfrm>
-          <a:prstGeom prst="rect">
-            <a:avLst/>
-          </a:prstGeom>
-          <a:noFill/>
-          <a:ln>
-            <a:solidFill>
-              <a:srgbClr val="FF0000"/>
-            </a:solidFill>
-          </a:ln>
-        </p:spPr>
-        <p:style>
-          <a:lnRef idx="2">
-            <a:schemeClr val="accent1">
-              <a:shade val="50000"/>
-            </a:schemeClr>
-          </a:lnRef>
-          <a:fillRef idx="1">
-            <a:schemeClr val="accent1"/>
-          </a:fillRef>
-          <a:effectRef idx="0">
-            <a:schemeClr val="accent1"/>
-          </a:effectRef>
-          <a:fontRef idx="minor">
-            <a:schemeClr val="lt1"/>
-          </a:fontRef>
-        </p:style>
-        <p:txBody>
-          <a:bodyPr rtlCol="0" anchor="ctr"/>
-          <a:lstStyle/>
-          <a:p>
-            <a:pPr algn="ctr"/>
-            <a:endParaRPr lang="fr-FR"/>
-          </a:p>
-        </p:txBody>
-      </p:sp>
-    </p:spTree>
-    <p:extLst>
-      <p:ext uri="{BB962C8B-B14F-4D97-AF65-F5344CB8AC3E}">
-        <p14:creationId xmlns:p14="http://schemas.microsoft.com/office/powerpoint/2010/main" val="1087507361"/>
-      </p:ext>
-    </p:extLst>
-  </p:cSld>
-  <p:clrMapOvr>
-    <a:masterClrMapping/>
-  </p:clrMapOvr>
-  <p:timing>
-    <p:tnLst>
-      <p:par>
-        <p:cTn id="1" dur="indefinite" restart="never" nodeType="tmRoot">
-          <p:childTnLst>
-            <p:seq concurrent="1" nextAc="seek">
-              <p:cTn id="2" dur="indefinite" nodeType="mainSeq">
-                <p:childTnLst>
-                  <p:par>
-                    <p:cTn id="3" fill="hold">
-                      <p:stCondLst>
-                        <p:cond delay="indefinite"/>
-                      </p:stCondLst>
-                      <p:childTnLst>
-                        <p:par>
-                          <p:cTn id="4" fill="hold">
-                            <p:stCondLst>
-                              <p:cond delay="0"/>
-                            </p:stCondLst>
-                            <p:childTnLst>
-                              <p:par>
-                                <p:cTn id="5" presetID="14" presetClass="entr" presetSubtype="10" fill="hold" grpId="0" nodeType="clickEffect">
-                                  <p:stCondLst>
-                                    <p:cond delay="0"/>
-                                  </p:stCondLst>
-                                  <p:childTnLst>
-                                    <p:set>
-                                      <p:cBhvr>
-                                        <p:cTn id="6" dur="1" fill="hold">
-                                          <p:stCondLst>
-                                            <p:cond delay="0"/>
-                                          </p:stCondLst>
-                                        </p:cTn>
-                                        <p:tgtEl>
-                                          <p:spTgt spid="7"/>
-                                        </p:tgtEl>
-                                        <p:attrNameLst>
-                                          <p:attrName>style.visibility</p:attrName>
-                                        </p:attrNameLst>
-                                      </p:cBhvr>
-                                      <p:to>
-                                        <p:strVal val="visible"/>
-                                      </p:to>
-                                    </p:set>
-                                    <p:animEffect transition="in" filter="randombar(horizontal)">
-                                      <p:cBhvr>
-                                        <p:cTn id="7" dur="500"/>
-                                        <p:tgtEl>
-                                          <p:spTgt spid="7"/>
-                                        </p:tgtEl>
-                                      </p:cBhvr>
-                                    </p:animEffect>
-                                  </p:childTnLst>
-                                </p:cTn>
-                              </p:par>
-                            </p:childTnLst>
-                          </p:cTn>
-                        </p:par>
-                      </p:childTnLst>
-                    </p:cTn>
-                  </p:par>
-                  <p:par>
-                    <p:cTn id="8" fill="hold">
-                      <p:stCondLst>
-                        <p:cond delay="indefinite"/>
-                      </p:stCondLst>
-                      <p:childTnLst>
-                        <p:par>
-                          <p:cTn id="9" fill="hold">
-                            <p:stCondLst>
-                              <p:cond delay="0"/>
-                            </p:stCondLst>
-                            <p:childTnLst>
-                              <p:par>
-                                <p:cTn id="10" presetID="14" presetClass="entr" presetSubtype="10" fill="hold" grpId="0" nodeType="clickEffect">
-                                  <p:stCondLst>
-                                    <p:cond delay="0"/>
-                                  </p:stCondLst>
-                                  <p:childTnLst>
-                                    <p:set>
-                                      <p:cBhvr>
-                                        <p:cTn id="11" dur="1" fill="hold">
-                                          <p:stCondLst>
-                                            <p:cond delay="0"/>
-                                          </p:stCondLst>
-                                        </p:cTn>
-                                        <p:tgtEl>
-                                          <p:spTgt spid="15"/>
-                                        </p:tgtEl>
-                                        <p:attrNameLst>
-                                          <p:attrName>style.visibility</p:attrName>
-                                        </p:attrNameLst>
-                                      </p:cBhvr>
-                                      <p:to>
-                                        <p:strVal val="visible"/>
-                                      </p:to>
-                                    </p:set>
-                                    <p:animEffect transition="in" filter="randombar(horizontal)">
-                                      <p:cBhvr>
-                                        <p:cTn id="12" dur="500"/>
-                                        <p:tgtEl>
-                                          <p:spTgt spid="15"/>
-                                        </p:tgtEl>
-                                      </p:cBhvr>
-                                    </p:animEffect>
-                                  </p:childTnLst>
-                                </p:cTn>
-                              </p:par>
-                            </p:childTnLst>
-                          </p:cTn>
-                        </p:par>
-                      </p:childTnLst>
-                    </p:cTn>
-                  </p:par>
-                  <p:par>
-                    <p:cTn id="13" fill="hold">
-                      <p:stCondLst>
-                        <p:cond delay="indefinite"/>
-                      </p:stCondLst>
-                      <p:childTnLst>
-                        <p:par>
-                          <p:cTn id="14" fill="hold">
-                            <p:stCondLst>
-                              <p:cond delay="0"/>
-                            </p:stCondLst>
-                            <p:childTnLst>
-                              <p:par>
-                                <p:cTn id="15" presetID="14" presetClass="entr" presetSubtype="10" fill="hold" nodeType="clickEffect">
-                                  <p:stCondLst>
-                                    <p:cond delay="0"/>
-                                  </p:stCondLst>
-                                  <p:childTnLst>
-                                    <p:set>
-                                      <p:cBhvr>
-                                        <p:cTn id="16" dur="1" fill="hold">
-                                          <p:stCondLst>
-                                            <p:cond delay="0"/>
-                                          </p:stCondLst>
-                                        </p:cTn>
-                                        <p:tgtEl>
-                                          <p:spTgt spid="24"/>
-                                        </p:tgtEl>
-                                        <p:attrNameLst>
-                                          <p:attrName>style.visibility</p:attrName>
-                                        </p:attrNameLst>
-                                      </p:cBhvr>
-                                      <p:to>
-                                        <p:strVal val="visible"/>
-                                      </p:to>
-                                    </p:set>
-                                    <p:animEffect transition="in" filter="randombar(horizontal)">
-                                      <p:cBhvr>
-                                        <p:cTn id="17" dur="500"/>
-                                        <p:tgtEl>
-                                          <p:spTgt spid="24"/>
-                                        </p:tgtEl>
-                                      </p:cBhvr>
-                                    </p:animEffect>
-                                  </p:childTnLst>
-                                </p:cTn>
-                              </p:par>
-                            </p:childTnLst>
-                          </p:cTn>
-                        </p:par>
-                      </p:childTnLst>
-                    </p:cTn>
-                  </p:par>
-                  <p:par>
-                    <p:cTn id="18" fill="hold">
-                      <p:stCondLst>
-                        <p:cond delay="indefinite"/>
-                      </p:stCondLst>
-                      <p:childTnLst>
-                        <p:par>
-                          <p:cTn id="19" fill="hold">
-                            <p:stCondLst>
-                              <p:cond delay="0"/>
-                            </p:stCondLst>
-                            <p:childTnLst>
-                              <p:par>
-                                <p:cTn id="20" presetID="14" presetClass="entr" presetSubtype="10" fill="hold" nodeType="clickEffect">
-                                  <p:stCondLst>
-                                    <p:cond delay="0"/>
-                                  </p:stCondLst>
-                                  <p:childTnLst>
-                                    <p:set>
-                                      <p:cBhvr>
-                                        <p:cTn id="21" dur="1" fill="hold">
-                                          <p:stCondLst>
-                                            <p:cond delay="0"/>
-                                          </p:stCondLst>
-                                        </p:cTn>
-                                        <p:tgtEl>
-                                          <p:spTgt spid="23"/>
-                                        </p:tgtEl>
-                                        <p:attrNameLst>
-                                          <p:attrName>style.visibility</p:attrName>
-                                        </p:attrNameLst>
-                                      </p:cBhvr>
-                                      <p:to>
-                                        <p:strVal val="visible"/>
-                                      </p:to>
-                                    </p:set>
-                                    <p:animEffect transition="in" filter="randombar(horizontal)">
-                                      <p:cBhvr>
-                                        <p:cTn id="22" dur="500"/>
-                                        <p:tgtEl>
-                                          <p:spTgt spid="23"/>
-                                        </p:tgtEl>
-                                      </p:cBhvr>
-                                    </p:animEffect>
-                                  </p:childTnLst>
-                                </p:cTn>
-                              </p:par>
-                            </p:childTnLst>
-                          </p:cTn>
-                        </p:par>
-                      </p:childTnLst>
-                    </p:cTn>
-                  </p:par>
-                </p:childTnLst>
-              </p:cTn>
-              <p:prevCondLst>
-                <p:cond evt="onPrev" delay="0">
-                  <p:tgtEl>
-                    <p:sldTgt/>
-                  </p:tgtEl>
-                </p:cond>
-              </p:prevCondLst>
-              <p:nextCondLst>
-                <p:cond evt="onNext" delay="0">
-                  <p:tgtEl>
-                    <p:sldTgt/>
-                  </p:tgtEl>
-                </p:cond>
-              </p:nextCondLst>
-            </p:seq>
-          </p:childTnLst>
-        </p:cTn>
-      </p:par>
-    </p:tnLst>
-    <p:bldLst>
-      <p:bldP spid="7" grpId="0" animBg="1"/>
-      <p:bldP spid="15" grpId="0"/>
-    </p:bldLst>
   </p:timing>
 </p:sld>
 </file>

</xml_diff>